<commit_message>
Debug and text clarification
</commit_message>
<xml_diff>
--- a/Anticorrelation of O3 and NO2_implications.pptx
+++ b/Anticorrelation of O3 and NO2_implications.pptx
@@ -1,6 +1,6 @@
 
 <file path=ppt/presentation.xml><?xml version="1.0" encoding="utf-8"?>
-<p:presentation xmlns:a="http://schemas.openxmlformats.org/drawingml/2006/main" xmlns:p="http://schemas.openxmlformats.org/presentationml/2006/main" xmlns:r="http://schemas.openxmlformats.org/officeDocument/2006/relationships" autoCompressPictures="0" saveSubsetFonts="1">
+<p:presentation xmlns:a="http://schemas.openxmlformats.org/drawingml/2006/main" xmlns:r="http://schemas.openxmlformats.org/officeDocument/2006/relationships" xmlns:p="http://schemas.openxmlformats.org/presentationml/2006/main" saveSubsetFonts="1" autoCompressPictures="0">
   <p:sldMasterIdLst>
     <p:sldMasterId id="2147483648" r:id="rId1"/>
   </p:sldMasterIdLst>
@@ -17,15 +17,16 @@
     <p:sldId id="265" r:id="rId11"/>
     <p:sldId id="266" r:id="rId12"/>
     <p:sldId id="267" r:id="rId13"/>
+    <p:sldId id="268" r:id="rId14"/>
   </p:sldIdLst>
-  <p:sldSz cx="9144000" cy="5143500" type="screen16x9"/>
+  <p:sldSz cx="9144000" cy="6858000" type="screen4x3"/>
   <p:notesSz cx="6858000" cy="9144000"/>
   <p:defaultTextStyle>
     <a:defPPr>
       <a:defRPr lang="en-US"/>
     </a:defPPr>
-    <a:lvl1pPr algn="l" defTabSz="457200" eaLnBrk="1" hangingPunct="1" latinLnBrk="0" marL="0" rtl="0">
-      <a:defRPr kern="1200" sz="1800">
+    <a:lvl1pPr marL="0" algn="l" defTabSz="457200" rtl="0" eaLnBrk="1" latinLnBrk="0" hangingPunct="1">
+      <a:defRPr sz="1800" kern="1200">
         <a:solidFill>
           <a:schemeClr val="tx1"/>
         </a:solidFill>
@@ -34,8 +35,8 @@
         <a:cs typeface="+mn-cs"/>
       </a:defRPr>
     </a:lvl1pPr>
-    <a:lvl2pPr algn="l" defTabSz="457200" eaLnBrk="1" hangingPunct="1" latinLnBrk="0" marL="457200" rtl="0">
-      <a:defRPr kern="1200" sz="1800">
+    <a:lvl2pPr marL="457200" algn="l" defTabSz="457200" rtl="0" eaLnBrk="1" latinLnBrk="0" hangingPunct="1">
+      <a:defRPr sz="1800" kern="1200">
         <a:solidFill>
           <a:schemeClr val="tx1"/>
         </a:solidFill>
@@ -44,8 +45,8 @@
         <a:cs typeface="+mn-cs"/>
       </a:defRPr>
     </a:lvl2pPr>
-    <a:lvl3pPr algn="l" defTabSz="457200" eaLnBrk="1" hangingPunct="1" latinLnBrk="0" marL="914400" rtl="0">
-      <a:defRPr kern="1200" sz="1800">
+    <a:lvl3pPr marL="914400" algn="l" defTabSz="457200" rtl="0" eaLnBrk="1" latinLnBrk="0" hangingPunct="1">
+      <a:defRPr sz="1800" kern="1200">
         <a:solidFill>
           <a:schemeClr val="tx1"/>
         </a:solidFill>
@@ -54,8 +55,8 @@
         <a:cs typeface="+mn-cs"/>
       </a:defRPr>
     </a:lvl3pPr>
-    <a:lvl4pPr algn="l" defTabSz="457200" eaLnBrk="1" hangingPunct="1" latinLnBrk="0" marL="1371600" rtl="0">
-      <a:defRPr kern="1200" sz="1800">
+    <a:lvl4pPr marL="1371600" algn="l" defTabSz="457200" rtl="0" eaLnBrk="1" latinLnBrk="0" hangingPunct="1">
+      <a:defRPr sz="1800" kern="1200">
         <a:solidFill>
           <a:schemeClr val="tx1"/>
         </a:solidFill>
@@ -64,8 +65,8 @@
         <a:cs typeface="+mn-cs"/>
       </a:defRPr>
     </a:lvl4pPr>
-    <a:lvl5pPr algn="l" defTabSz="457200" eaLnBrk="1" hangingPunct="1" latinLnBrk="0" marL="1828800" rtl="0">
-      <a:defRPr kern="1200" sz="1800">
+    <a:lvl5pPr marL="1828800" algn="l" defTabSz="457200" rtl="0" eaLnBrk="1" latinLnBrk="0" hangingPunct="1">
+      <a:defRPr sz="1800" kern="1200">
         <a:solidFill>
           <a:schemeClr val="tx1"/>
         </a:solidFill>
@@ -74,8 +75,8 @@
         <a:cs typeface="+mn-cs"/>
       </a:defRPr>
     </a:lvl5pPr>
-    <a:lvl6pPr algn="l" defTabSz="457200" eaLnBrk="1" hangingPunct="1" latinLnBrk="0" marL="2286000" rtl="0">
-      <a:defRPr kern="1200" sz="1800">
+    <a:lvl6pPr marL="2286000" algn="l" defTabSz="457200" rtl="0" eaLnBrk="1" latinLnBrk="0" hangingPunct="1">
+      <a:defRPr sz="1800" kern="1200">
         <a:solidFill>
           <a:schemeClr val="tx1"/>
         </a:solidFill>
@@ -84,8 +85,8 @@
         <a:cs typeface="+mn-cs"/>
       </a:defRPr>
     </a:lvl6pPr>
-    <a:lvl7pPr algn="l" defTabSz="457200" eaLnBrk="1" hangingPunct="1" latinLnBrk="0" marL="2743200" rtl="0">
-      <a:defRPr kern="1200" sz="1800">
+    <a:lvl7pPr marL="2743200" algn="l" defTabSz="457200" rtl="0" eaLnBrk="1" latinLnBrk="0" hangingPunct="1">
+      <a:defRPr sz="1800" kern="1200">
         <a:solidFill>
           <a:schemeClr val="tx1"/>
         </a:solidFill>
@@ -94,8 +95,8 @@
         <a:cs typeface="+mn-cs"/>
       </a:defRPr>
     </a:lvl7pPr>
-    <a:lvl8pPr algn="l" defTabSz="457200" eaLnBrk="1" hangingPunct="1" latinLnBrk="0" marL="3200400" rtl="0">
-      <a:defRPr kern="1200" sz="1800">
+    <a:lvl8pPr marL="3200400" algn="l" defTabSz="457200" rtl="0" eaLnBrk="1" latinLnBrk="0" hangingPunct="1">
+      <a:defRPr sz="1800" kern="1200">
         <a:solidFill>
           <a:schemeClr val="tx1"/>
         </a:solidFill>
@@ -104,8 +105,8 @@
         <a:cs typeface="+mn-cs"/>
       </a:defRPr>
     </a:lvl8pPr>
-    <a:lvl9pPr algn="l" defTabSz="457200" eaLnBrk="1" hangingPunct="1" latinLnBrk="0" marL="3657600" rtl="0">
-      <a:defRPr kern="1200" sz="1800">
+    <a:lvl9pPr marL="3657600" algn="l" defTabSz="457200" rtl="0" eaLnBrk="1" latinLnBrk="0" hangingPunct="1">
+      <a:defRPr sz="1800" kern="1200">
         <a:solidFill>
           <a:schemeClr val="tx1"/>
         </a:solidFill>
@@ -118,12 +119,12 @@
   <p:extLst>
     <p:ext uri="{EFAFB233-063F-42B5-8137-9DF3F51BA10A}">
       <p15:sldGuideLst xmlns:p15="http://schemas.microsoft.com/office/powerpoint/2012/main">
-        <p15:guide id="1" orient="horz" pos="1620" userDrawn="1">
+        <p15:guide id="1" orient="horz" pos="2160">
           <p15:clr>
             <a:srgbClr val="A4A3A4"/>
           </p15:clr>
         </p15:guide>
-        <p15:guide id="2" pos="2880" userDrawn="1">
+        <p15:guide id="2" pos="2880">
           <p15:clr>
             <a:srgbClr val="A4A3A4"/>
           </p15:clr>
@@ -163,8 +164,8 @@
         </p:nvSpPr>
         <p:spPr>
           <a:xfrm>
-            <a:off x="685800" y="1597819"/>
-            <a:ext cx="7772400" cy="1102519"/>
+            <a:off x="685800" y="2130425"/>
+            <a:ext cx="7772400" cy="1470025"/>
           </a:xfrm>
         </p:spPr>
         <p:txBody>
@@ -190,8 +191,8 @@
         </p:nvSpPr>
         <p:spPr>
           <a:xfrm>
-            <a:off x="1371600" y="2914650"/>
-            <a:ext cx="6400800" cy="1314450"/>
+            <a:off x="1371600" y="3886200"/>
+            <a:ext cx="6400800" cy="1752600"/>
           </a:xfrm>
         </p:spPr>
         <p:txBody>
@@ -207,7 +208,7 @@
                 </a:solidFill>
               </a:defRPr>
             </a:lvl1pPr>
-            <a:lvl2pPr marL="342900" indent="0" algn="ctr">
+            <a:lvl2pPr marL="457200" indent="0" algn="ctr">
               <a:buNone/>
               <a:defRPr>
                 <a:solidFill>
@@ -217,7 +218,7 @@
                 </a:solidFill>
               </a:defRPr>
             </a:lvl2pPr>
-            <a:lvl3pPr marL="685800" indent="0" algn="ctr">
+            <a:lvl3pPr marL="914400" indent="0" algn="ctr">
               <a:buNone/>
               <a:defRPr>
                 <a:solidFill>
@@ -227,7 +228,7 @@
                 </a:solidFill>
               </a:defRPr>
             </a:lvl3pPr>
-            <a:lvl4pPr marL="1028700" indent="0" algn="ctr">
+            <a:lvl4pPr marL="1371600" indent="0" algn="ctr">
               <a:buNone/>
               <a:defRPr>
                 <a:solidFill>
@@ -237,7 +238,7 @@
                 </a:solidFill>
               </a:defRPr>
             </a:lvl4pPr>
-            <a:lvl5pPr marL="1371600" indent="0" algn="ctr">
+            <a:lvl5pPr marL="1828800" indent="0" algn="ctr">
               <a:buNone/>
               <a:defRPr>
                 <a:solidFill>
@@ -247,7 +248,7 @@
                 </a:solidFill>
               </a:defRPr>
             </a:lvl5pPr>
-            <a:lvl6pPr marL="1714500" indent="0" algn="ctr">
+            <a:lvl6pPr marL="2286000" indent="0" algn="ctr">
               <a:buNone/>
               <a:defRPr>
                 <a:solidFill>
@@ -257,7 +258,7 @@
                 </a:solidFill>
               </a:defRPr>
             </a:lvl6pPr>
-            <a:lvl7pPr marL="2057400" indent="0" algn="ctr">
+            <a:lvl7pPr marL="2743200" indent="0" algn="ctr">
               <a:buNone/>
               <a:defRPr>
                 <a:solidFill>
@@ -267,7 +268,7 @@
                 </a:solidFill>
               </a:defRPr>
             </a:lvl7pPr>
-            <a:lvl8pPr marL="2400300" indent="0" algn="ctr">
+            <a:lvl8pPr marL="3200400" indent="0" algn="ctr">
               <a:buNone/>
               <a:defRPr>
                 <a:solidFill>
@@ -277,7 +278,7 @@
                 </a:solidFill>
               </a:defRPr>
             </a:lvl8pPr>
-            <a:lvl9pPr marL="2743200" indent="0" algn="ctr">
+            <a:lvl9pPr marL="3657600" indent="0" algn="ctr">
               <a:buNone/>
               <a:defRPr>
                 <a:solidFill>
@@ -313,7 +314,7 @@
           <a:p>
             <a:fld id="{241EB5C9-1307-BA42-ABA2-0BC069CD8E7F}" type="datetimeFigureOut">
               <a:rPr lang="en-US" smtClean="0"/>
-              <a:t>1/2/22</a:t>
+              <a:t>4/2/2025</a:t>
             </a:fld>
             <a:endParaRPr lang="en-US"/>
           </a:p>
@@ -355,7 +356,7 @@
           <a:p>
             <a:fld id="{C5EF2332-01BF-834F-8236-50238282D533}" type="slidenum">
               <a:rPr lang="en-US" smtClean="0"/>
-              <a:t>‹#›</a:t>
+              <a:t>‹Nr.›</a:t>
             </a:fld>
             <a:endParaRPr lang="en-US"/>
           </a:p>
@@ -481,7 +482,7 @@
           <a:p>
             <a:fld id="{241EB5C9-1307-BA42-ABA2-0BC069CD8E7F}" type="datetimeFigureOut">
               <a:rPr lang="en-US" smtClean="0"/>
-              <a:t>1/2/22</a:t>
+              <a:t>4/2/2025</a:t>
             </a:fld>
             <a:endParaRPr lang="en-US"/>
           </a:p>
@@ -523,7 +524,7 @@
           <a:p>
             <a:fld id="{C5EF2332-01BF-834F-8236-50238282D533}" type="slidenum">
               <a:rPr lang="en-US" smtClean="0"/>
-              <a:t>‹#›</a:t>
+              <a:t>‹Nr.›</a:t>
             </a:fld>
             <a:endParaRPr lang="en-US"/>
           </a:p>
@@ -571,8 +572,8 @@
         </p:nvSpPr>
         <p:spPr>
           <a:xfrm>
-            <a:off x="6629400" y="205979"/>
-            <a:ext cx="2057400" cy="4388644"/>
+            <a:off x="6629400" y="274638"/>
+            <a:ext cx="2057400" cy="5851525"/>
           </a:xfrm>
         </p:spPr>
         <p:txBody>
@@ -598,8 +599,8 @@
         </p:nvSpPr>
         <p:spPr>
           <a:xfrm>
-            <a:off x="457200" y="205979"/>
-            <a:ext cx="6019800" cy="4388644"/>
+            <a:off x="457200" y="274638"/>
+            <a:ext cx="6019800" cy="5851525"/>
           </a:xfrm>
         </p:spPr>
         <p:txBody>
@@ -659,7 +660,7 @@
           <a:p>
             <a:fld id="{241EB5C9-1307-BA42-ABA2-0BC069CD8E7F}" type="datetimeFigureOut">
               <a:rPr lang="en-US" smtClean="0"/>
-              <a:t>1/2/22</a:t>
+              <a:t>4/2/2025</a:t>
             </a:fld>
             <a:endParaRPr lang="en-US"/>
           </a:p>
@@ -701,7 +702,7 @@
           <a:p>
             <a:fld id="{C5EF2332-01BF-834F-8236-50238282D533}" type="slidenum">
               <a:rPr lang="en-US" smtClean="0"/>
-              <a:t>‹#›</a:t>
+              <a:t>‹Nr.›</a:t>
             </a:fld>
             <a:endParaRPr lang="en-US"/>
           </a:p>
@@ -827,7 +828,7 @@
           <a:p>
             <a:fld id="{241EB5C9-1307-BA42-ABA2-0BC069CD8E7F}" type="datetimeFigureOut">
               <a:rPr lang="en-US" smtClean="0"/>
-              <a:t>1/2/22</a:t>
+              <a:t>4/2/2025</a:t>
             </a:fld>
             <a:endParaRPr lang="en-US"/>
           </a:p>
@@ -869,7 +870,7 @@
           <a:p>
             <a:fld id="{C5EF2332-01BF-834F-8236-50238282D533}" type="slidenum">
               <a:rPr lang="en-US" smtClean="0"/>
-              <a:t>‹#›</a:t>
+              <a:t>‹Nr.›</a:t>
             </a:fld>
             <a:endParaRPr lang="en-US"/>
           </a:p>
@@ -917,15 +918,15 @@
         </p:nvSpPr>
         <p:spPr>
           <a:xfrm>
-            <a:off x="722313" y="3305176"/>
-            <a:ext cx="7772400" cy="1021556"/>
+            <a:off x="722313" y="4406900"/>
+            <a:ext cx="7772400" cy="1362075"/>
           </a:xfrm>
         </p:spPr>
         <p:txBody>
           <a:bodyPr anchor="t"/>
           <a:lstStyle>
             <a:lvl1pPr algn="l">
-              <a:defRPr sz="3000" b="1" cap="all"/>
+              <a:defRPr sz="4000" b="1" cap="all"/>
             </a:lvl1pPr>
           </a:lstStyle>
           <a:p>
@@ -948,8 +949,8 @@
         </p:nvSpPr>
         <p:spPr>
           <a:xfrm>
-            <a:off x="722313" y="2180035"/>
-            <a:ext cx="7772400" cy="1125140"/>
+            <a:off x="722313" y="2906713"/>
+            <a:ext cx="7772400" cy="1500187"/>
           </a:xfrm>
         </p:spPr>
         <p:txBody>
@@ -957,7 +958,7 @@
           <a:lstStyle>
             <a:lvl1pPr marL="0" indent="0">
               <a:buNone/>
-              <a:defRPr sz="1500">
+              <a:defRPr sz="2000">
                 <a:solidFill>
                   <a:schemeClr val="tx1">
                     <a:tint val="75000"/>
@@ -965,9 +966,9 @@
                 </a:solidFill>
               </a:defRPr>
             </a:lvl1pPr>
-            <a:lvl2pPr marL="342900" indent="0">
-              <a:buNone/>
-              <a:defRPr sz="1350">
+            <a:lvl2pPr marL="457200" indent="0">
+              <a:buNone/>
+              <a:defRPr sz="1800">
                 <a:solidFill>
                   <a:schemeClr val="tx1">
                     <a:tint val="75000"/>
@@ -975,9 +976,9 @@
                 </a:solidFill>
               </a:defRPr>
             </a:lvl2pPr>
-            <a:lvl3pPr marL="685800" indent="0">
-              <a:buNone/>
-              <a:defRPr sz="1200">
+            <a:lvl3pPr marL="914400" indent="0">
+              <a:buNone/>
+              <a:defRPr sz="1600">
                 <a:solidFill>
                   <a:schemeClr val="tx1">
                     <a:tint val="75000"/>
@@ -985,9 +986,9 @@
                 </a:solidFill>
               </a:defRPr>
             </a:lvl3pPr>
-            <a:lvl4pPr marL="1028700" indent="0">
-              <a:buNone/>
-              <a:defRPr sz="1050">
+            <a:lvl4pPr marL="1371600" indent="0">
+              <a:buNone/>
+              <a:defRPr sz="1400">
                 <a:solidFill>
                   <a:schemeClr val="tx1">
                     <a:tint val="75000"/>
@@ -995,9 +996,9 @@
                 </a:solidFill>
               </a:defRPr>
             </a:lvl4pPr>
-            <a:lvl5pPr marL="1371600" indent="0">
-              <a:buNone/>
-              <a:defRPr sz="1050">
+            <a:lvl5pPr marL="1828800" indent="0">
+              <a:buNone/>
+              <a:defRPr sz="1400">
                 <a:solidFill>
                   <a:schemeClr val="tx1">
                     <a:tint val="75000"/>
@@ -1005,9 +1006,9 @@
                 </a:solidFill>
               </a:defRPr>
             </a:lvl5pPr>
-            <a:lvl6pPr marL="1714500" indent="0">
-              <a:buNone/>
-              <a:defRPr sz="1050">
+            <a:lvl6pPr marL="2286000" indent="0">
+              <a:buNone/>
+              <a:defRPr sz="1400">
                 <a:solidFill>
                   <a:schemeClr val="tx1">
                     <a:tint val="75000"/>
@@ -1015,9 +1016,9 @@
                 </a:solidFill>
               </a:defRPr>
             </a:lvl6pPr>
-            <a:lvl7pPr marL="2057400" indent="0">
-              <a:buNone/>
-              <a:defRPr sz="1050">
+            <a:lvl7pPr marL="2743200" indent="0">
+              <a:buNone/>
+              <a:defRPr sz="1400">
                 <a:solidFill>
                   <a:schemeClr val="tx1">
                     <a:tint val="75000"/>
@@ -1025,9 +1026,9 @@
                 </a:solidFill>
               </a:defRPr>
             </a:lvl7pPr>
-            <a:lvl8pPr marL="2400300" indent="0">
-              <a:buNone/>
-              <a:defRPr sz="1050">
+            <a:lvl8pPr marL="3200400" indent="0">
+              <a:buNone/>
+              <a:defRPr sz="1400">
                 <a:solidFill>
                   <a:schemeClr val="tx1">
                     <a:tint val="75000"/>
@@ -1035,9 +1036,9 @@
                 </a:solidFill>
               </a:defRPr>
             </a:lvl8pPr>
-            <a:lvl9pPr marL="2743200" indent="0">
-              <a:buNone/>
-              <a:defRPr sz="1050">
+            <a:lvl9pPr marL="3657600" indent="0">
+              <a:buNone/>
+              <a:defRPr sz="1400">
                 <a:solidFill>
                   <a:schemeClr val="tx1">
                     <a:tint val="75000"/>
@@ -1072,7 +1073,7 @@
           <a:p>
             <a:fld id="{241EB5C9-1307-BA42-ABA2-0BC069CD8E7F}" type="datetimeFigureOut">
               <a:rPr lang="en-US" smtClean="0"/>
-              <a:t>1/2/22</a:t>
+              <a:t>4/2/2025</a:t>
             </a:fld>
             <a:endParaRPr lang="en-US"/>
           </a:p>
@@ -1114,7 +1115,7 @@
           <a:p>
             <a:fld id="{C5EF2332-01BF-834F-8236-50238282D533}" type="slidenum">
               <a:rPr lang="en-US" smtClean="0"/>
-              <a:t>‹#›</a:t>
+              <a:t>‹Nr.›</a:t>
             </a:fld>
             <a:endParaRPr lang="en-US"/>
           </a:p>
@@ -1184,39 +1185,39 @@
         </p:nvSpPr>
         <p:spPr>
           <a:xfrm>
-            <a:off x="457200" y="1200151"/>
-            <a:ext cx="4038600" cy="3394472"/>
+            <a:off x="457200" y="1600200"/>
+            <a:ext cx="4038600" cy="4525963"/>
           </a:xfrm>
         </p:spPr>
         <p:txBody>
           <a:bodyPr/>
           <a:lstStyle>
             <a:lvl1pPr>
-              <a:defRPr sz="2100"/>
+              <a:defRPr sz="2800"/>
             </a:lvl1pPr>
             <a:lvl2pPr>
-              <a:defRPr sz="1800"/>
+              <a:defRPr sz="2400"/>
             </a:lvl2pPr>
             <a:lvl3pPr>
-              <a:defRPr sz="1500"/>
+              <a:defRPr sz="2000"/>
             </a:lvl3pPr>
             <a:lvl4pPr>
-              <a:defRPr sz="1350"/>
+              <a:defRPr sz="1800"/>
             </a:lvl4pPr>
             <a:lvl5pPr>
-              <a:defRPr sz="1350"/>
+              <a:defRPr sz="1800"/>
             </a:lvl5pPr>
             <a:lvl6pPr>
-              <a:defRPr sz="1350"/>
+              <a:defRPr sz="1800"/>
             </a:lvl6pPr>
             <a:lvl7pPr>
-              <a:defRPr sz="1350"/>
+              <a:defRPr sz="1800"/>
             </a:lvl7pPr>
             <a:lvl8pPr>
-              <a:defRPr sz="1350"/>
+              <a:defRPr sz="1800"/>
             </a:lvl8pPr>
             <a:lvl9pPr>
-              <a:defRPr sz="1350"/>
+              <a:defRPr sz="1800"/>
             </a:lvl9pPr>
           </a:lstStyle>
           <a:p>
@@ -1268,39 +1269,39 @@
         </p:nvSpPr>
         <p:spPr>
           <a:xfrm>
-            <a:off x="4648200" y="1200151"/>
-            <a:ext cx="4038600" cy="3394472"/>
+            <a:off x="4648200" y="1600200"/>
+            <a:ext cx="4038600" cy="4525963"/>
           </a:xfrm>
         </p:spPr>
         <p:txBody>
           <a:bodyPr/>
           <a:lstStyle>
             <a:lvl1pPr>
-              <a:defRPr sz="2100"/>
+              <a:defRPr sz="2800"/>
             </a:lvl1pPr>
             <a:lvl2pPr>
-              <a:defRPr sz="1800"/>
+              <a:defRPr sz="2400"/>
             </a:lvl2pPr>
             <a:lvl3pPr>
-              <a:defRPr sz="1500"/>
+              <a:defRPr sz="2000"/>
             </a:lvl3pPr>
             <a:lvl4pPr>
-              <a:defRPr sz="1350"/>
+              <a:defRPr sz="1800"/>
             </a:lvl4pPr>
             <a:lvl5pPr>
-              <a:defRPr sz="1350"/>
+              <a:defRPr sz="1800"/>
             </a:lvl5pPr>
             <a:lvl6pPr>
-              <a:defRPr sz="1350"/>
+              <a:defRPr sz="1800"/>
             </a:lvl6pPr>
             <a:lvl7pPr>
-              <a:defRPr sz="1350"/>
+              <a:defRPr sz="1800"/>
             </a:lvl7pPr>
             <a:lvl8pPr>
-              <a:defRPr sz="1350"/>
+              <a:defRPr sz="1800"/>
             </a:lvl8pPr>
             <a:lvl9pPr>
-              <a:defRPr sz="1350"/>
+              <a:defRPr sz="1800"/>
             </a:lvl9pPr>
           </a:lstStyle>
           <a:p>
@@ -1357,7 +1358,7 @@
           <a:p>
             <a:fld id="{241EB5C9-1307-BA42-ABA2-0BC069CD8E7F}" type="datetimeFigureOut">
               <a:rPr lang="en-US" smtClean="0"/>
-              <a:t>1/2/22</a:t>
+              <a:t>4/2/2025</a:t>
             </a:fld>
             <a:endParaRPr lang="en-US"/>
           </a:p>
@@ -1399,7 +1400,7 @@
           <a:p>
             <a:fld id="{C5EF2332-01BF-834F-8236-50238282D533}" type="slidenum">
               <a:rPr lang="en-US" smtClean="0"/>
-              <a:t>‹#›</a:t>
+              <a:t>‹Nr.›</a:t>
             </a:fld>
             <a:endParaRPr lang="en-US"/>
           </a:p>
@@ -1473,8 +1474,8 @@
         </p:nvSpPr>
         <p:spPr>
           <a:xfrm>
-            <a:off x="457200" y="1151335"/>
-            <a:ext cx="4040188" cy="479822"/>
+            <a:off x="457200" y="1535113"/>
+            <a:ext cx="4040188" cy="639762"/>
           </a:xfrm>
         </p:spPr>
         <p:txBody>
@@ -1482,39 +1483,39 @@
           <a:lstStyle>
             <a:lvl1pPr marL="0" indent="0">
               <a:buNone/>
+              <a:defRPr sz="2400" b="1"/>
+            </a:lvl1pPr>
+            <a:lvl2pPr marL="457200" indent="0">
+              <a:buNone/>
+              <a:defRPr sz="2000" b="1"/>
+            </a:lvl2pPr>
+            <a:lvl3pPr marL="914400" indent="0">
+              <a:buNone/>
               <a:defRPr sz="1800" b="1"/>
-            </a:lvl1pPr>
-            <a:lvl2pPr marL="342900" indent="0">
-              <a:buNone/>
-              <a:defRPr sz="1500" b="1"/>
-            </a:lvl2pPr>
-            <a:lvl3pPr marL="685800" indent="0">
-              <a:buNone/>
-              <a:defRPr sz="1350" b="1"/>
             </a:lvl3pPr>
-            <a:lvl4pPr marL="1028700" indent="0">
-              <a:buNone/>
-              <a:defRPr sz="1200" b="1"/>
+            <a:lvl4pPr marL="1371600" indent="0">
+              <a:buNone/>
+              <a:defRPr sz="1600" b="1"/>
             </a:lvl4pPr>
-            <a:lvl5pPr marL="1371600" indent="0">
-              <a:buNone/>
-              <a:defRPr sz="1200" b="1"/>
+            <a:lvl5pPr marL="1828800" indent="0">
+              <a:buNone/>
+              <a:defRPr sz="1600" b="1"/>
             </a:lvl5pPr>
-            <a:lvl6pPr marL="1714500" indent="0">
-              <a:buNone/>
-              <a:defRPr sz="1200" b="1"/>
+            <a:lvl6pPr marL="2286000" indent="0">
+              <a:buNone/>
+              <a:defRPr sz="1600" b="1"/>
             </a:lvl6pPr>
-            <a:lvl7pPr marL="2057400" indent="0">
-              <a:buNone/>
-              <a:defRPr sz="1200" b="1"/>
+            <a:lvl7pPr marL="2743200" indent="0">
+              <a:buNone/>
+              <a:defRPr sz="1600" b="1"/>
             </a:lvl7pPr>
-            <a:lvl8pPr marL="2400300" indent="0">
-              <a:buNone/>
-              <a:defRPr sz="1200" b="1"/>
+            <a:lvl8pPr marL="3200400" indent="0">
+              <a:buNone/>
+              <a:defRPr sz="1600" b="1"/>
             </a:lvl8pPr>
-            <a:lvl9pPr marL="2743200" indent="0">
-              <a:buNone/>
-              <a:defRPr sz="1200" b="1"/>
+            <a:lvl9pPr marL="3657600" indent="0">
+              <a:buNone/>
+              <a:defRPr sz="1600" b="1"/>
             </a:lvl9pPr>
           </a:lstStyle>
           <a:p>
@@ -1538,39 +1539,39 @@
         </p:nvSpPr>
         <p:spPr>
           <a:xfrm>
-            <a:off x="457200" y="1631156"/>
-            <a:ext cx="4040188" cy="2963466"/>
+            <a:off x="457200" y="2174875"/>
+            <a:ext cx="4040188" cy="3951288"/>
           </a:xfrm>
         </p:spPr>
         <p:txBody>
           <a:bodyPr/>
           <a:lstStyle>
             <a:lvl1pPr>
-              <a:defRPr sz="1800"/>
+              <a:defRPr sz="2400"/>
             </a:lvl1pPr>
             <a:lvl2pPr>
-              <a:defRPr sz="1500"/>
+              <a:defRPr sz="2000"/>
             </a:lvl2pPr>
             <a:lvl3pPr>
-              <a:defRPr sz="1350"/>
+              <a:defRPr sz="1800"/>
             </a:lvl3pPr>
             <a:lvl4pPr>
-              <a:defRPr sz="1200"/>
+              <a:defRPr sz="1600"/>
             </a:lvl4pPr>
             <a:lvl5pPr>
-              <a:defRPr sz="1200"/>
+              <a:defRPr sz="1600"/>
             </a:lvl5pPr>
             <a:lvl6pPr>
-              <a:defRPr sz="1200"/>
+              <a:defRPr sz="1600"/>
             </a:lvl6pPr>
             <a:lvl7pPr>
-              <a:defRPr sz="1200"/>
+              <a:defRPr sz="1600"/>
             </a:lvl7pPr>
             <a:lvl8pPr>
-              <a:defRPr sz="1200"/>
+              <a:defRPr sz="1600"/>
             </a:lvl8pPr>
             <a:lvl9pPr>
-              <a:defRPr sz="1200"/>
+              <a:defRPr sz="1600"/>
             </a:lvl9pPr>
           </a:lstStyle>
           <a:p>
@@ -1622,8 +1623,8 @@
         </p:nvSpPr>
         <p:spPr>
           <a:xfrm>
-            <a:off x="4645026" y="1151335"/>
-            <a:ext cx="4041775" cy="479822"/>
+            <a:off x="4645025" y="1535113"/>
+            <a:ext cx="4041775" cy="639762"/>
           </a:xfrm>
         </p:spPr>
         <p:txBody>
@@ -1631,39 +1632,39 @@
           <a:lstStyle>
             <a:lvl1pPr marL="0" indent="0">
               <a:buNone/>
+              <a:defRPr sz="2400" b="1"/>
+            </a:lvl1pPr>
+            <a:lvl2pPr marL="457200" indent="0">
+              <a:buNone/>
+              <a:defRPr sz="2000" b="1"/>
+            </a:lvl2pPr>
+            <a:lvl3pPr marL="914400" indent="0">
+              <a:buNone/>
               <a:defRPr sz="1800" b="1"/>
-            </a:lvl1pPr>
-            <a:lvl2pPr marL="342900" indent="0">
-              <a:buNone/>
-              <a:defRPr sz="1500" b="1"/>
-            </a:lvl2pPr>
-            <a:lvl3pPr marL="685800" indent="0">
-              <a:buNone/>
-              <a:defRPr sz="1350" b="1"/>
             </a:lvl3pPr>
-            <a:lvl4pPr marL="1028700" indent="0">
-              <a:buNone/>
-              <a:defRPr sz="1200" b="1"/>
+            <a:lvl4pPr marL="1371600" indent="0">
+              <a:buNone/>
+              <a:defRPr sz="1600" b="1"/>
             </a:lvl4pPr>
-            <a:lvl5pPr marL="1371600" indent="0">
-              <a:buNone/>
-              <a:defRPr sz="1200" b="1"/>
+            <a:lvl5pPr marL="1828800" indent="0">
+              <a:buNone/>
+              <a:defRPr sz="1600" b="1"/>
             </a:lvl5pPr>
-            <a:lvl6pPr marL="1714500" indent="0">
-              <a:buNone/>
-              <a:defRPr sz="1200" b="1"/>
+            <a:lvl6pPr marL="2286000" indent="0">
+              <a:buNone/>
+              <a:defRPr sz="1600" b="1"/>
             </a:lvl6pPr>
-            <a:lvl7pPr marL="2057400" indent="0">
-              <a:buNone/>
-              <a:defRPr sz="1200" b="1"/>
+            <a:lvl7pPr marL="2743200" indent="0">
+              <a:buNone/>
+              <a:defRPr sz="1600" b="1"/>
             </a:lvl7pPr>
-            <a:lvl8pPr marL="2400300" indent="0">
-              <a:buNone/>
-              <a:defRPr sz="1200" b="1"/>
+            <a:lvl8pPr marL="3200400" indent="0">
+              <a:buNone/>
+              <a:defRPr sz="1600" b="1"/>
             </a:lvl8pPr>
-            <a:lvl9pPr marL="2743200" indent="0">
-              <a:buNone/>
-              <a:defRPr sz="1200" b="1"/>
+            <a:lvl9pPr marL="3657600" indent="0">
+              <a:buNone/>
+              <a:defRPr sz="1600" b="1"/>
             </a:lvl9pPr>
           </a:lstStyle>
           <a:p>
@@ -1687,39 +1688,39 @@
         </p:nvSpPr>
         <p:spPr>
           <a:xfrm>
-            <a:off x="4645026" y="1631156"/>
-            <a:ext cx="4041775" cy="2963466"/>
+            <a:off x="4645025" y="2174875"/>
+            <a:ext cx="4041775" cy="3951288"/>
           </a:xfrm>
         </p:spPr>
         <p:txBody>
           <a:bodyPr/>
           <a:lstStyle>
             <a:lvl1pPr>
-              <a:defRPr sz="1800"/>
+              <a:defRPr sz="2400"/>
             </a:lvl1pPr>
             <a:lvl2pPr>
-              <a:defRPr sz="1500"/>
+              <a:defRPr sz="2000"/>
             </a:lvl2pPr>
             <a:lvl3pPr>
-              <a:defRPr sz="1350"/>
+              <a:defRPr sz="1800"/>
             </a:lvl3pPr>
             <a:lvl4pPr>
-              <a:defRPr sz="1200"/>
+              <a:defRPr sz="1600"/>
             </a:lvl4pPr>
             <a:lvl5pPr>
-              <a:defRPr sz="1200"/>
+              <a:defRPr sz="1600"/>
             </a:lvl5pPr>
             <a:lvl6pPr>
-              <a:defRPr sz="1200"/>
+              <a:defRPr sz="1600"/>
             </a:lvl6pPr>
             <a:lvl7pPr>
-              <a:defRPr sz="1200"/>
+              <a:defRPr sz="1600"/>
             </a:lvl7pPr>
             <a:lvl8pPr>
-              <a:defRPr sz="1200"/>
+              <a:defRPr sz="1600"/>
             </a:lvl8pPr>
             <a:lvl9pPr>
-              <a:defRPr sz="1200"/>
+              <a:defRPr sz="1600"/>
             </a:lvl9pPr>
           </a:lstStyle>
           <a:p>
@@ -1776,7 +1777,7 @@
           <a:p>
             <a:fld id="{241EB5C9-1307-BA42-ABA2-0BC069CD8E7F}" type="datetimeFigureOut">
               <a:rPr lang="en-US" smtClean="0"/>
-              <a:t>1/2/22</a:t>
+              <a:t>4/2/2025</a:t>
             </a:fld>
             <a:endParaRPr lang="en-US"/>
           </a:p>
@@ -1818,7 +1819,7 @@
           <a:p>
             <a:fld id="{C5EF2332-01BF-834F-8236-50238282D533}" type="slidenum">
               <a:rPr lang="en-US" smtClean="0"/>
-              <a:t>‹#›</a:t>
+              <a:t>‹Nr.›</a:t>
             </a:fld>
             <a:endParaRPr lang="en-US"/>
           </a:p>
@@ -1893,7 +1894,7 @@
           <a:p>
             <a:fld id="{241EB5C9-1307-BA42-ABA2-0BC069CD8E7F}" type="datetimeFigureOut">
               <a:rPr lang="en-US" smtClean="0"/>
-              <a:t>1/2/22</a:t>
+              <a:t>4/2/2025</a:t>
             </a:fld>
             <a:endParaRPr lang="en-US"/>
           </a:p>
@@ -1935,7 +1936,7 @@
           <a:p>
             <a:fld id="{C5EF2332-01BF-834F-8236-50238282D533}" type="slidenum">
               <a:rPr lang="en-US" smtClean="0"/>
-              <a:t>‹#›</a:t>
+              <a:t>‹Nr.›</a:t>
             </a:fld>
             <a:endParaRPr lang="en-US"/>
           </a:p>
@@ -1988,7 +1989,7 @@
           <a:p>
             <a:fld id="{241EB5C9-1307-BA42-ABA2-0BC069CD8E7F}" type="datetimeFigureOut">
               <a:rPr lang="en-US" smtClean="0"/>
-              <a:t>1/2/22</a:t>
+              <a:t>4/2/2025</a:t>
             </a:fld>
             <a:endParaRPr lang="en-US"/>
           </a:p>
@@ -2030,7 +2031,7 @@
           <a:p>
             <a:fld id="{C5EF2332-01BF-834F-8236-50238282D533}" type="slidenum">
               <a:rPr lang="en-US" smtClean="0"/>
-              <a:t>‹#›</a:t>
+              <a:t>‹Nr.›</a:t>
             </a:fld>
             <a:endParaRPr lang="en-US"/>
           </a:p>
@@ -2078,15 +2079,15 @@
         </p:nvSpPr>
         <p:spPr>
           <a:xfrm>
-            <a:off x="457201" y="204787"/>
-            <a:ext cx="3008313" cy="871538"/>
+            <a:off x="457200" y="273050"/>
+            <a:ext cx="3008313" cy="1162050"/>
           </a:xfrm>
         </p:spPr>
         <p:txBody>
           <a:bodyPr anchor="b"/>
           <a:lstStyle>
             <a:lvl1pPr algn="l">
-              <a:defRPr sz="1500" b="1"/>
+              <a:defRPr sz="2000" b="1"/>
             </a:lvl1pPr>
           </a:lstStyle>
           <a:p>
@@ -2109,39 +2110,39 @@
         </p:nvSpPr>
         <p:spPr>
           <a:xfrm>
-            <a:off x="3575050" y="204788"/>
-            <a:ext cx="5111750" cy="4389835"/>
+            <a:off x="3575050" y="273050"/>
+            <a:ext cx="5111750" cy="5853113"/>
           </a:xfrm>
         </p:spPr>
         <p:txBody>
           <a:bodyPr/>
           <a:lstStyle>
             <a:lvl1pPr>
-              <a:defRPr sz="2400"/>
+              <a:defRPr sz="3200"/>
             </a:lvl1pPr>
             <a:lvl2pPr>
-              <a:defRPr sz="2100"/>
+              <a:defRPr sz="2800"/>
             </a:lvl2pPr>
             <a:lvl3pPr>
-              <a:defRPr sz="1800"/>
+              <a:defRPr sz="2400"/>
             </a:lvl3pPr>
             <a:lvl4pPr>
-              <a:defRPr sz="1500"/>
+              <a:defRPr sz="2000"/>
             </a:lvl4pPr>
             <a:lvl5pPr>
-              <a:defRPr sz="1500"/>
+              <a:defRPr sz="2000"/>
             </a:lvl5pPr>
             <a:lvl6pPr>
-              <a:defRPr sz="1500"/>
+              <a:defRPr sz="2000"/>
             </a:lvl6pPr>
             <a:lvl7pPr>
-              <a:defRPr sz="1500"/>
+              <a:defRPr sz="2000"/>
             </a:lvl7pPr>
             <a:lvl8pPr>
-              <a:defRPr sz="1500"/>
+              <a:defRPr sz="2000"/>
             </a:lvl8pPr>
             <a:lvl9pPr>
-              <a:defRPr sz="1500"/>
+              <a:defRPr sz="2000"/>
             </a:lvl9pPr>
           </a:lstStyle>
           <a:p>
@@ -2193,8 +2194,8 @@
         </p:nvSpPr>
         <p:spPr>
           <a:xfrm>
-            <a:off x="457201" y="1076326"/>
-            <a:ext cx="3008313" cy="3518297"/>
+            <a:off x="457200" y="1435100"/>
+            <a:ext cx="3008313" cy="4691063"/>
           </a:xfrm>
         </p:spPr>
         <p:txBody>
@@ -2202,39 +2203,39 @@
           <a:lstStyle>
             <a:lvl1pPr marL="0" indent="0">
               <a:buNone/>
-              <a:defRPr sz="1050"/>
+              <a:defRPr sz="1400"/>
             </a:lvl1pPr>
-            <a:lvl2pPr marL="342900" indent="0">
+            <a:lvl2pPr marL="457200" indent="0">
+              <a:buNone/>
+              <a:defRPr sz="1200"/>
+            </a:lvl2pPr>
+            <a:lvl3pPr marL="914400" indent="0">
+              <a:buNone/>
+              <a:defRPr sz="1000"/>
+            </a:lvl3pPr>
+            <a:lvl4pPr marL="1371600" indent="0">
               <a:buNone/>
               <a:defRPr sz="900"/>
-            </a:lvl2pPr>
-            <a:lvl3pPr marL="685800" indent="0">
-              <a:buNone/>
-              <a:defRPr sz="750"/>
-            </a:lvl3pPr>
-            <a:lvl4pPr marL="1028700" indent="0">
-              <a:buNone/>
-              <a:defRPr sz="675"/>
             </a:lvl4pPr>
-            <a:lvl5pPr marL="1371600" indent="0">
-              <a:buNone/>
-              <a:defRPr sz="675"/>
+            <a:lvl5pPr marL="1828800" indent="0">
+              <a:buNone/>
+              <a:defRPr sz="900"/>
             </a:lvl5pPr>
-            <a:lvl6pPr marL="1714500" indent="0">
-              <a:buNone/>
-              <a:defRPr sz="675"/>
+            <a:lvl6pPr marL="2286000" indent="0">
+              <a:buNone/>
+              <a:defRPr sz="900"/>
             </a:lvl6pPr>
-            <a:lvl7pPr marL="2057400" indent="0">
-              <a:buNone/>
-              <a:defRPr sz="675"/>
+            <a:lvl7pPr marL="2743200" indent="0">
+              <a:buNone/>
+              <a:defRPr sz="900"/>
             </a:lvl7pPr>
-            <a:lvl8pPr marL="2400300" indent="0">
-              <a:buNone/>
-              <a:defRPr sz="675"/>
+            <a:lvl8pPr marL="3200400" indent="0">
+              <a:buNone/>
+              <a:defRPr sz="900"/>
             </a:lvl8pPr>
-            <a:lvl9pPr marL="2743200" indent="0">
-              <a:buNone/>
-              <a:defRPr sz="675"/>
+            <a:lvl9pPr marL="3657600" indent="0">
+              <a:buNone/>
+              <a:defRPr sz="900"/>
             </a:lvl9pPr>
           </a:lstStyle>
           <a:p>
@@ -2263,7 +2264,7 @@
           <a:p>
             <a:fld id="{241EB5C9-1307-BA42-ABA2-0BC069CD8E7F}" type="datetimeFigureOut">
               <a:rPr lang="en-US" smtClean="0"/>
-              <a:t>1/2/22</a:t>
+              <a:t>4/2/2025</a:t>
             </a:fld>
             <a:endParaRPr lang="en-US"/>
           </a:p>
@@ -2305,7 +2306,7 @@
           <a:p>
             <a:fld id="{C5EF2332-01BF-834F-8236-50238282D533}" type="slidenum">
               <a:rPr lang="en-US" smtClean="0"/>
-              <a:t>‹#›</a:t>
+              <a:t>‹Nr.›</a:t>
             </a:fld>
             <a:endParaRPr lang="en-US"/>
           </a:p>
@@ -2353,15 +2354,15 @@
         </p:nvSpPr>
         <p:spPr>
           <a:xfrm>
-            <a:off x="1792288" y="3600450"/>
-            <a:ext cx="5486400" cy="425054"/>
+            <a:off x="1792288" y="4800600"/>
+            <a:ext cx="5486400" cy="566738"/>
           </a:xfrm>
         </p:spPr>
         <p:txBody>
           <a:bodyPr anchor="b"/>
           <a:lstStyle>
             <a:lvl1pPr algn="l">
-              <a:defRPr sz="1500" b="1"/>
+              <a:defRPr sz="2000" b="1"/>
             </a:lvl1pPr>
           </a:lstStyle>
           <a:p>
@@ -2384,8 +2385,8 @@
         </p:nvSpPr>
         <p:spPr>
           <a:xfrm>
-            <a:off x="1792288" y="459581"/>
-            <a:ext cx="5486400" cy="3086100"/>
+            <a:off x="1792288" y="612775"/>
+            <a:ext cx="5486400" cy="4114800"/>
           </a:xfrm>
         </p:spPr>
         <p:txBody>
@@ -2393,39 +2394,39 @@
           <a:lstStyle>
             <a:lvl1pPr marL="0" indent="0">
               <a:buNone/>
+              <a:defRPr sz="3200"/>
+            </a:lvl1pPr>
+            <a:lvl2pPr marL="457200" indent="0">
+              <a:buNone/>
+              <a:defRPr sz="2800"/>
+            </a:lvl2pPr>
+            <a:lvl3pPr marL="914400" indent="0">
+              <a:buNone/>
               <a:defRPr sz="2400"/>
-            </a:lvl1pPr>
-            <a:lvl2pPr marL="342900" indent="0">
-              <a:buNone/>
-              <a:defRPr sz="2100"/>
-            </a:lvl2pPr>
-            <a:lvl3pPr marL="685800" indent="0">
-              <a:buNone/>
-              <a:defRPr sz="1800"/>
             </a:lvl3pPr>
-            <a:lvl4pPr marL="1028700" indent="0">
-              <a:buNone/>
-              <a:defRPr sz="1500"/>
+            <a:lvl4pPr marL="1371600" indent="0">
+              <a:buNone/>
+              <a:defRPr sz="2000"/>
             </a:lvl4pPr>
-            <a:lvl5pPr marL="1371600" indent="0">
-              <a:buNone/>
-              <a:defRPr sz="1500"/>
+            <a:lvl5pPr marL="1828800" indent="0">
+              <a:buNone/>
+              <a:defRPr sz="2000"/>
             </a:lvl5pPr>
-            <a:lvl6pPr marL="1714500" indent="0">
-              <a:buNone/>
-              <a:defRPr sz="1500"/>
+            <a:lvl6pPr marL="2286000" indent="0">
+              <a:buNone/>
+              <a:defRPr sz="2000"/>
             </a:lvl6pPr>
-            <a:lvl7pPr marL="2057400" indent="0">
-              <a:buNone/>
-              <a:defRPr sz="1500"/>
+            <a:lvl7pPr marL="2743200" indent="0">
+              <a:buNone/>
+              <a:defRPr sz="2000"/>
             </a:lvl7pPr>
-            <a:lvl8pPr marL="2400300" indent="0">
-              <a:buNone/>
-              <a:defRPr sz="1500"/>
+            <a:lvl8pPr marL="3200400" indent="0">
+              <a:buNone/>
+              <a:defRPr sz="2000"/>
             </a:lvl8pPr>
-            <a:lvl9pPr marL="2743200" indent="0">
-              <a:buNone/>
-              <a:defRPr sz="1500"/>
+            <a:lvl9pPr marL="3657600" indent="0">
+              <a:buNone/>
+              <a:defRPr sz="2000"/>
             </a:lvl9pPr>
           </a:lstStyle>
           <a:p>
@@ -2445,8 +2446,8 @@
         </p:nvSpPr>
         <p:spPr>
           <a:xfrm>
-            <a:off x="1792288" y="4025503"/>
-            <a:ext cx="5486400" cy="603647"/>
+            <a:off x="1792288" y="5367338"/>
+            <a:ext cx="5486400" cy="804862"/>
           </a:xfrm>
         </p:spPr>
         <p:txBody>
@@ -2454,39 +2455,39 @@
           <a:lstStyle>
             <a:lvl1pPr marL="0" indent="0">
               <a:buNone/>
-              <a:defRPr sz="1050"/>
+              <a:defRPr sz="1400"/>
             </a:lvl1pPr>
-            <a:lvl2pPr marL="342900" indent="0">
+            <a:lvl2pPr marL="457200" indent="0">
+              <a:buNone/>
+              <a:defRPr sz="1200"/>
+            </a:lvl2pPr>
+            <a:lvl3pPr marL="914400" indent="0">
+              <a:buNone/>
+              <a:defRPr sz="1000"/>
+            </a:lvl3pPr>
+            <a:lvl4pPr marL="1371600" indent="0">
               <a:buNone/>
               <a:defRPr sz="900"/>
-            </a:lvl2pPr>
-            <a:lvl3pPr marL="685800" indent="0">
-              <a:buNone/>
-              <a:defRPr sz="750"/>
-            </a:lvl3pPr>
-            <a:lvl4pPr marL="1028700" indent="0">
-              <a:buNone/>
-              <a:defRPr sz="675"/>
             </a:lvl4pPr>
-            <a:lvl5pPr marL="1371600" indent="0">
-              <a:buNone/>
-              <a:defRPr sz="675"/>
+            <a:lvl5pPr marL="1828800" indent="0">
+              <a:buNone/>
+              <a:defRPr sz="900"/>
             </a:lvl5pPr>
-            <a:lvl6pPr marL="1714500" indent="0">
-              <a:buNone/>
-              <a:defRPr sz="675"/>
+            <a:lvl6pPr marL="2286000" indent="0">
+              <a:buNone/>
+              <a:defRPr sz="900"/>
             </a:lvl6pPr>
-            <a:lvl7pPr marL="2057400" indent="0">
-              <a:buNone/>
-              <a:defRPr sz="675"/>
+            <a:lvl7pPr marL="2743200" indent="0">
+              <a:buNone/>
+              <a:defRPr sz="900"/>
             </a:lvl7pPr>
-            <a:lvl8pPr marL="2400300" indent="0">
-              <a:buNone/>
-              <a:defRPr sz="675"/>
+            <a:lvl8pPr marL="3200400" indent="0">
+              <a:buNone/>
+              <a:defRPr sz="900"/>
             </a:lvl8pPr>
-            <a:lvl9pPr marL="2743200" indent="0">
-              <a:buNone/>
-              <a:defRPr sz="675"/>
+            <a:lvl9pPr marL="3657600" indent="0">
+              <a:buNone/>
+              <a:defRPr sz="900"/>
             </a:lvl9pPr>
           </a:lstStyle>
           <a:p>
@@ -2515,7 +2516,7 @@
           <a:p>
             <a:fld id="{241EB5C9-1307-BA42-ABA2-0BC069CD8E7F}" type="datetimeFigureOut">
               <a:rPr lang="en-US" smtClean="0"/>
-              <a:t>1/2/22</a:t>
+              <a:t>4/2/2025</a:t>
             </a:fld>
             <a:endParaRPr lang="en-US"/>
           </a:p>
@@ -2557,7 +2558,7 @@
           <a:p>
             <a:fld id="{C5EF2332-01BF-834F-8236-50238282D533}" type="slidenum">
               <a:rPr lang="en-US" smtClean="0"/>
-              <a:t>‹#›</a:t>
+              <a:t>‹Nr.›</a:t>
             </a:fld>
             <a:endParaRPr lang="en-US"/>
           </a:p>
@@ -2577,7 +2578,7 @@
 </file>
 
 <file path=ppt/slideMasters/slideMaster1.xml><?xml version="1.0" encoding="utf-8"?>
-<p:sldMaster xmlns:a="http://schemas.openxmlformats.org/drawingml/2006/main" xmlns:p="http://schemas.openxmlformats.org/presentationml/2006/main" xmlns:r="http://schemas.openxmlformats.org/officeDocument/2006/relationships">
+<p:sldMaster xmlns:a="http://schemas.openxmlformats.org/drawingml/2006/main" xmlns:r="http://schemas.openxmlformats.org/officeDocument/2006/relationships" xmlns:p="http://schemas.openxmlformats.org/presentationml/2006/main">
   <p:cSld>
     <p:bg>
       <p:bgRef idx="1001">
@@ -2610,15 +2611,15 @@
         </p:nvSpPr>
         <p:spPr>
           <a:xfrm>
-            <a:off x="457200" y="205979"/>
-            <a:ext cx="8229600" cy="857250"/>
+            <a:off x="457200" y="274638"/>
+            <a:ext cx="8229600" cy="1143000"/>
           </a:xfrm>
           <a:prstGeom prst="rect">
             <a:avLst/>
           </a:prstGeom>
         </p:spPr>
         <p:txBody>
-          <a:bodyPr anchor="ctr" bIns="45720" lIns="91440" rIns="91440" rtlCol="0" tIns="45720" vert="horz">
+          <a:bodyPr vert="horz" lIns="91440" tIns="45720" rIns="91440" bIns="45720" rtlCol="0" anchor="ctr">
             <a:normAutofit/>
           </a:bodyPr>
           <a:lstStyle/>
@@ -2637,20 +2638,20 @@
             <a:spLocks noGrp="1"/>
           </p:cNvSpPr>
           <p:nvPr>
-            <p:ph idx="1" type="body"/>
+            <p:ph type="body" idx="1"/>
           </p:nvPr>
         </p:nvSpPr>
         <p:spPr>
           <a:xfrm>
-            <a:off x="457200" y="1200151"/>
-            <a:ext cx="8229600" cy="3394472"/>
+            <a:off x="457200" y="1600200"/>
+            <a:ext cx="8229600" cy="4525963"/>
           </a:xfrm>
           <a:prstGeom prst="rect">
             <a:avLst/>
           </a:prstGeom>
         </p:spPr>
         <p:txBody>
-          <a:bodyPr bIns="45720" lIns="91440" rIns="91440" rtlCol="0" tIns="45720" vert="horz">
+          <a:bodyPr vert="horz" lIns="91440" tIns="45720" rIns="91440" bIns="45720" rtlCol="0">
             <a:normAutofit/>
           </a:bodyPr>
           <a:lstStyle/>
@@ -2698,23 +2699,23 @@
             <a:spLocks noGrp="1"/>
           </p:cNvSpPr>
           <p:nvPr>
-            <p:ph idx="2" sz="half" type="dt"/>
+            <p:ph type="dt" sz="half" idx="2"/>
           </p:nvPr>
         </p:nvSpPr>
         <p:spPr>
           <a:xfrm>
-            <a:off x="457200" y="4767263"/>
-            <a:ext cx="2133600" cy="273844"/>
+            <a:off x="457200" y="6356350"/>
+            <a:ext cx="2133600" cy="365125"/>
           </a:xfrm>
           <a:prstGeom prst="rect">
             <a:avLst/>
           </a:prstGeom>
         </p:spPr>
         <p:txBody>
-          <a:bodyPr anchor="ctr" bIns="45720" lIns="91440" rIns="91440" rtlCol="0" tIns="45720" vert="horz"/>
+          <a:bodyPr vert="horz" lIns="91440" tIns="45720" rIns="91440" bIns="45720" rtlCol="0" anchor="ctr"/>
           <a:lstStyle>
             <a:lvl1pPr algn="l">
-              <a:defRPr sz="900">
+              <a:defRPr sz="1200">
                 <a:solidFill>
                   <a:schemeClr val="tx1">
                     <a:tint val="75000"/>
@@ -2726,7 +2727,7 @@
           <a:p>
             <a:fld id="{241EB5C9-1307-BA42-ABA2-0BC069CD8E7F}" type="datetimeFigureOut">
               <a:rPr lang="en-US" smtClean="0"/>
-              <a:t>1/2/22</a:t>
+              <a:t>4/2/2025</a:t>
             </a:fld>
             <a:endParaRPr lang="en-US"/>
           </a:p>
@@ -2739,23 +2740,23 @@
             <a:spLocks noGrp="1"/>
           </p:cNvSpPr>
           <p:nvPr>
-            <p:ph idx="3" sz="quarter" type="ftr"/>
+            <p:ph type="ftr" sz="quarter" idx="3"/>
           </p:nvPr>
         </p:nvSpPr>
         <p:spPr>
           <a:xfrm>
-            <a:off x="3124200" y="4767263"/>
-            <a:ext cx="2895600" cy="273844"/>
+            <a:off x="3124200" y="6356350"/>
+            <a:ext cx="2895600" cy="365125"/>
           </a:xfrm>
           <a:prstGeom prst="rect">
             <a:avLst/>
           </a:prstGeom>
         </p:spPr>
         <p:txBody>
-          <a:bodyPr anchor="ctr" bIns="45720" lIns="91440" rIns="91440" rtlCol="0" tIns="45720" vert="horz"/>
+          <a:bodyPr vert="horz" lIns="91440" tIns="45720" rIns="91440" bIns="45720" rtlCol="0" anchor="ctr"/>
           <a:lstStyle>
             <a:lvl1pPr algn="ctr">
-              <a:defRPr sz="900">
+              <a:defRPr sz="1200">
                 <a:solidFill>
                   <a:schemeClr val="tx1">
                     <a:tint val="75000"/>
@@ -2776,23 +2777,23 @@
             <a:spLocks noGrp="1"/>
           </p:cNvSpPr>
           <p:nvPr>
-            <p:ph idx="4" sz="quarter" type="sldNum"/>
+            <p:ph type="sldNum" sz="quarter" idx="4"/>
           </p:nvPr>
         </p:nvSpPr>
         <p:spPr>
           <a:xfrm>
-            <a:off x="6553200" y="4767263"/>
-            <a:ext cx="2133600" cy="273844"/>
+            <a:off x="6553200" y="6356350"/>
+            <a:ext cx="2133600" cy="365125"/>
           </a:xfrm>
           <a:prstGeom prst="rect">
             <a:avLst/>
           </a:prstGeom>
         </p:spPr>
         <p:txBody>
-          <a:bodyPr anchor="ctr" bIns="45720" lIns="91440" rIns="91440" rtlCol="0" tIns="45720" vert="horz"/>
+          <a:bodyPr vert="horz" lIns="91440" tIns="45720" rIns="91440" bIns="45720" rtlCol="0" anchor="ctr"/>
           <a:lstStyle>
             <a:lvl1pPr algn="r">
-              <a:defRPr sz="900">
+              <a:defRPr sz="1200">
                 <a:solidFill>
                   <a:schemeClr val="tx1">
                     <a:tint val="75000"/>
@@ -2804,7 +2805,7 @@
           <a:p>
             <a:fld id="{C5EF2332-01BF-834F-8236-50238282D533}" type="slidenum">
               <a:rPr lang="en-US" smtClean="0"/>
-              <a:t>‹#›</a:t>
+              <a:t>‹Nr.›</a:t>
             </a:fld>
             <a:endParaRPr lang="en-US"/>
           </a:p>
@@ -2817,7 +2818,7 @@
       </p:ext>
     </p:extLst>
   </p:cSld>
-  <p:clrMap accent1="accent1" accent2="accent2" accent3="accent3" accent4="accent4" accent5="accent5" accent6="accent6" bg1="lt1" bg2="lt2" folHlink="folHlink" hlink="hlink" tx1="dk1" tx2="dk2"/>
+  <p:clrMap bg1="lt1" tx1="dk1" bg2="lt2" tx2="dk2" accent1="accent1" accent2="accent2" accent3="accent3" accent4="accent4" accent5="accent5" accent6="accent6" hlink="hlink" folHlink="folHlink"/>
   <p:sldLayoutIdLst>
     <p:sldLayoutId id="2147483649" r:id="rId1"/>
     <p:sldLayoutId id="2147483650" r:id="rId2"/>
@@ -2833,12 +2834,12 @@
   </p:sldLayoutIdLst>
   <p:txStyles>
     <p:titleStyle>
-      <a:lvl1pPr algn="ctr" defTabSz="342900" eaLnBrk="1" hangingPunct="1" latinLnBrk="0" rtl="0">
+      <a:lvl1pPr algn="ctr" defTabSz="457200" rtl="0" eaLnBrk="1" latinLnBrk="0" hangingPunct="1">
         <a:spcBef>
           <a:spcPct val="0"/>
         </a:spcBef>
         <a:buNone/>
-        <a:defRPr kern="1200" sz="3300">
+        <a:defRPr sz="4400" kern="1200">
           <a:solidFill>
             <a:schemeClr val="tx1"/>
           </a:solidFill>
@@ -2849,13 +2850,13 @@
       </a:lvl1pPr>
     </p:titleStyle>
     <p:bodyStyle>
-      <a:lvl1pPr algn="l" defTabSz="342900" eaLnBrk="1" hangingPunct="1" indent="-342900" latinLnBrk="0" marL="342900" rtl="0">
+      <a:lvl1pPr marL="342900" indent="-342900" algn="l" defTabSz="457200" rtl="0" eaLnBrk="1" latinLnBrk="0" hangingPunct="1">
         <a:spcBef>
           <a:spcPct val="20000"/>
         </a:spcBef>
         <a:buFont typeface="Arial"/>
         <a:buChar char="•"/>
-        <a:defRPr kern="1200" sz="2400">
+        <a:defRPr sz="3200" kern="1200">
           <a:solidFill>
             <a:schemeClr val="tx1"/>
           </a:solidFill>
@@ -2864,13 +2865,13 @@
           <a:cs typeface="+mn-cs"/>
         </a:defRPr>
       </a:lvl1pPr>
-      <a:lvl2pPr algn="l" defTabSz="342900" eaLnBrk="1" hangingPunct="1" indent="-342900" latinLnBrk="0" marL="685800" rtl="0">
+      <a:lvl2pPr marL="742950" indent="-285750" algn="l" defTabSz="457200" rtl="0" eaLnBrk="1" latinLnBrk="0" hangingPunct="1">
         <a:spcBef>
           <a:spcPct val="20000"/>
         </a:spcBef>
         <a:buFont typeface="Arial"/>
         <a:buChar char="–"/>
-        <a:defRPr kern="1200" sz="2100">
+        <a:defRPr sz="2800" kern="1200">
           <a:solidFill>
             <a:schemeClr val="tx1"/>
           </a:solidFill>
@@ -2879,13 +2880,13 @@
           <a:cs typeface="+mn-cs"/>
         </a:defRPr>
       </a:lvl2pPr>
-      <a:lvl3pPr algn="l" defTabSz="342900" eaLnBrk="1" hangingPunct="1" indent="-342900" latinLnBrk="0" marL="1028700" rtl="0">
+      <a:lvl3pPr marL="1143000" indent="-228600" algn="l" defTabSz="457200" rtl="0" eaLnBrk="1" latinLnBrk="0" hangingPunct="1">
         <a:spcBef>
           <a:spcPct val="20000"/>
         </a:spcBef>
         <a:buFont typeface="Arial"/>
         <a:buChar char="•"/>
-        <a:defRPr kern="1200" sz="1800">
+        <a:defRPr sz="2400" kern="1200">
           <a:solidFill>
             <a:schemeClr val="tx1"/>
           </a:solidFill>
@@ -2894,13 +2895,13 @@
           <a:cs typeface="+mn-cs"/>
         </a:defRPr>
       </a:lvl3pPr>
-      <a:lvl4pPr algn="l" defTabSz="342900" eaLnBrk="1" hangingPunct="1" indent="-342900" latinLnBrk="0" marL="1371600" rtl="0">
+      <a:lvl4pPr marL="1600200" indent="-228600" algn="l" defTabSz="457200" rtl="0" eaLnBrk="1" latinLnBrk="0" hangingPunct="1">
         <a:spcBef>
           <a:spcPct val="20000"/>
         </a:spcBef>
         <a:buFont typeface="Arial"/>
         <a:buChar char="–"/>
-        <a:defRPr kern="1200" sz="1500">
+        <a:defRPr sz="2000" kern="1200">
           <a:solidFill>
             <a:schemeClr val="tx1"/>
           </a:solidFill>
@@ -2909,13 +2910,13 @@
           <a:cs typeface="+mn-cs"/>
         </a:defRPr>
       </a:lvl4pPr>
-      <a:lvl5pPr algn="l" defTabSz="342900" eaLnBrk="1" hangingPunct="1" indent="-342900" latinLnBrk="0" marL="1714500" rtl="0">
+      <a:lvl5pPr marL="2057400" indent="-228600" algn="l" defTabSz="457200" rtl="0" eaLnBrk="1" latinLnBrk="0" hangingPunct="1">
         <a:spcBef>
           <a:spcPct val="20000"/>
         </a:spcBef>
         <a:buFont typeface="Arial"/>
         <a:buChar char="»"/>
-        <a:defRPr kern="1200" sz="1500">
+        <a:defRPr sz="2000" kern="1200">
           <a:solidFill>
             <a:schemeClr val="tx1"/>
           </a:solidFill>
@@ -2924,13 +2925,13 @@
           <a:cs typeface="+mn-cs"/>
         </a:defRPr>
       </a:lvl5pPr>
-      <a:lvl6pPr algn="l" defTabSz="342900" eaLnBrk="1" hangingPunct="1" indent="-342900" latinLnBrk="0" marL="2057400" rtl="0">
+      <a:lvl6pPr marL="2514600" indent="-228600" algn="l" defTabSz="457200" rtl="0" eaLnBrk="1" latinLnBrk="0" hangingPunct="1">
         <a:spcBef>
           <a:spcPct val="20000"/>
         </a:spcBef>
         <a:buFont typeface="Arial"/>
         <a:buChar char="•"/>
-        <a:defRPr kern="1200" sz="1500">
+        <a:defRPr sz="2000" kern="1200">
           <a:solidFill>
             <a:schemeClr val="tx1"/>
           </a:solidFill>
@@ -2939,13 +2940,13 @@
           <a:cs typeface="+mn-cs"/>
         </a:defRPr>
       </a:lvl6pPr>
-      <a:lvl7pPr algn="l" defTabSz="342900" eaLnBrk="1" hangingPunct="1" indent="-342900" latinLnBrk="0" marL="2400300" rtl="0">
+      <a:lvl7pPr marL="2971800" indent="-228600" algn="l" defTabSz="457200" rtl="0" eaLnBrk="1" latinLnBrk="0" hangingPunct="1">
         <a:spcBef>
           <a:spcPct val="20000"/>
         </a:spcBef>
         <a:buFont typeface="Arial"/>
         <a:buChar char="•"/>
-        <a:defRPr kern="1200" sz="1500">
+        <a:defRPr sz="2000" kern="1200">
           <a:solidFill>
             <a:schemeClr val="tx1"/>
           </a:solidFill>
@@ -2954,13 +2955,13 @@
           <a:cs typeface="+mn-cs"/>
         </a:defRPr>
       </a:lvl7pPr>
-      <a:lvl8pPr algn="l" defTabSz="342900" eaLnBrk="1" hangingPunct="1" indent="-342900" latinLnBrk="0" marL="2743200" rtl="0">
+      <a:lvl8pPr marL="3429000" indent="-228600" algn="l" defTabSz="457200" rtl="0" eaLnBrk="1" latinLnBrk="0" hangingPunct="1">
         <a:spcBef>
           <a:spcPct val="20000"/>
         </a:spcBef>
         <a:buFont typeface="Arial"/>
         <a:buChar char="•"/>
-        <a:defRPr kern="1200" sz="1500">
+        <a:defRPr sz="2000" kern="1200">
           <a:solidFill>
             <a:schemeClr val="tx1"/>
           </a:solidFill>
@@ -2969,13 +2970,13 @@
           <a:cs typeface="+mn-cs"/>
         </a:defRPr>
       </a:lvl8pPr>
-      <a:lvl9pPr algn="l" defTabSz="342900" eaLnBrk="1" hangingPunct="1" indent="-342900" latinLnBrk="0" marL="3086100" rtl="0">
+      <a:lvl9pPr marL="3886200" indent="-228600" algn="l" defTabSz="457200" rtl="0" eaLnBrk="1" latinLnBrk="0" hangingPunct="1">
         <a:spcBef>
           <a:spcPct val="20000"/>
         </a:spcBef>
         <a:buFont typeface="Arial"/>
         <a:buChar char="•"/>
-        <a:defRPr kern="1200" sz="1500">
+        <a:defRPr sz="2000" kern="1200">
           <a:solidFill>
             <a:schemeClr val="tx1"/>
           </a:solidFill>
@@ -2989,8 +2990,8 @@
       <a:defPPr>
         <a:defRPr lang="en-US"/>
       </a:defPPr>
-      <a:lvl1pPr algn="l" defTabSz="342900" eaLnBrk="1" hangingPunct="1" latinLnBrk="0" marL="0" rtl="0">
-        <a:defRPr kern="1200" sz="1350">
+      <a:lvl1pPr marL="0" algn="l" defTabSz="457200" rtl="0" eaLnBrk="1" latinLnBrk="0" hangingPunct="1">
+        <a:defRPr sz="1800" kern="1200">
           <a:solidFill>
             <a:schemeClr val="tx1"/>
           </a:solidFill>
@@ -2999,8 +3000,8 @@
           <a:cs typeface="+mn-cs"/>
         </a:defRPr>
       </a:lvl1pPr>
-      <a:lvl2pPr algn="l" defTabSz="342900" eaLnBrk="1" hangingPunct="1" latinLnBrk="0" marL="342900" rtl="0">
-        <a:defRPr kern="1200" sz="1350">
+      <a:lvl2pPr marL="457200" algn="l" defTabSz="457200" rtl="0" eaLnBrk="1" latinLnBrk="0" hangingPunct="1">
+        <a:defRPr sz="1800" kern="1200">
           <a:solidFill>
             <a:schemeClr val="tx1"/>
           </a:solidFill>
@@ -3009,8 +3010,8 @@
           <a:cs typeface="+mn-cs"/>
         </a:defRPr>
       </a:lvl2pPr>
-      <a:lvl3pPr algn="l" defTabSz="342900" eaLnBrk="1" hangingPunct="1" latinLnBrk="0" marL="685800" rtl="0">
-        <a:defRPr kern="1200" sz="1350">
+      <a:lvl3pPr marL="914400" algn="l" defTabSz="457200" rtl="0" eaLnBrk="1" latinLnBrk="0" hangingPunct="1">
+        <a:defRPr sz="1800" kern="1200">
           <a:solidFill>
             <a:schemeClr val="tx1"/>
           </a:solidFill>
@@ -3019,8 +3020,8 @@
           <a:cs typeface="+mn-cs"/>
         </a:defRPr>
       </a:lvl3pPr>
-      <a:lvl4pPr algn="l" defTabSz="342900" eaLnBrk="1" hangingPunct="1" latinLnBrk="0" marL="1028700" rtl="0">
-        <a:defRPr kern="1200" sz="1350">
+      <a:lvl4pPr marL="1371600" algn="l" defTabSz="457200" rtl="0" eaLnBrk="1" latinLnBrk="0" hangingPunct="1">
+        <a:defRPr sz="1800" kern="1200">
           <a:solidFill>
             <a:schemeClr val="tx1"/>
           </a:solidFill>
@@ -3029,8 +3030,8 @@
           <a:cs typeface="+mn-cs"/>
         </a:defRPr>
       </a:lvl4pPr>
-      <a:lvl5pPr algn="l" defTabSz="342900" eaLnBrk="1" hangingPunct="1" latinLnBrk="0" marL="1371600" rtl="0">
-        <a:defRPr kern="1200" sz="1350">
+      <a:lvl5pPr marL="1828800" algn="l" defTabSz="457200" rtl="0" eaLnBrk="1" latinLnBrk="0" hangingPunct="1">
+        <a:defRPr sz="1800" kern="1200">
           <a:solidFill>
             <a:schemeClr val="tx1"/>
           </a:solidFill>
@@ -3039,8 +3040,8 @@
           <a:cs typeface="+mn-cs"/>
         </a:defRPr>
       </a:lvl5pPr>
-      <a:lvl6pPr algn="l" defTabSz="342900" eaLnBrk="1" hangingPunct="1" latinLnBrk="0" marL="1714500" rtl="0">
-        <a:defRPr kern="1200" sz="1350">
+      <a:lvl6pPr marL="2286000" algn="l" defTabSz="457200" rtl="0" eaLnBrk="1" latinLnBrk="0" hangingPunct="1">
+        <a:defRPr sz="1800" kern="1200">
           <a:solidFill>
             <a:schemeClr val="tx1"/>
           </a:solidFill>
@@ -3049,8 +3050,8 @@
           <a:cs typeface="+mn-cs"/>
         </a:defRPr>
       </a:lvl6pPr>
-      <a:lvl7pPr algn="l" defTabSz="342900" eaLnBrk="1" hangingPunct="1" latinLnBrk="0" marL="2057400" rtl="0">
-        <a:defRPr kern="1200" sz="1350">
+      <a:lvl7pPr marL="2743200" algn="l" defTabSz="457200" rtl="0" eaLnBrk="1" latinLnBrk="0" hangingPunct="1">
+        <a:defRPr sz="1800" kern="1200">
           <a:solidFill>
             <a:schemeClr val="tx1"/>
           </a:solidFill>
@@ -3059,8 +3060,8 @@
           <a:cs typeface="+mn-cs"/>
         </a:defRPr>
       </a:lvl7pPr>
-      <a:lvl8pPr algn="l" defTabSz="342900" eaLnBrk="1" hangingPunct="1" latinLnBrk="0" marL="2400300" rtl="0">
-        <a:defRPr kern="1200" sz="1350">
+      <a:lvl8pPr marL="3200400" algn="l" defTabSz="457200" rtl="0" eaLnBrk="1" latinLnBrk="0" hangingPunct="1">
+        <a:defRPr sz="1800" kern="1200">
           <a:solidFill>
             <a:schemeClr val="tx1"/>
           </a:solidFill>
@@ -3069,8 +3070,8 @@
           <a:cs typeface="+mn-cs"/>
         </a:defRPr>
       </a:lvl8pPr>
-      <a:lvl9pPr algn="l" defTabSz="342900" eaLnBrk="1" hangingPunct="1" latinLnBrk="0" marL="2743200" rtl="0">
-        <a:defRPr kern="1200" sz="1350">
+      <a:lvl9pPr marL="3657600" algn="l" defTabSz="457200" rtl="0" eaLnBrk="1" latinLnBrk="0" hangingPunct="1">
+        <a:defRPr sz="1800" kern="1200">
           <a:solidFill>
             <a:schemeClr val="tx1"/>
           </a:solidFill>
@@ -3113,19 +3114,18 @@
         </p:nvSpPr>
         <p:spPr>
           <a:xfrm>
-            <a:off x="685800" y="1597819"/>
-            <a:ext cx="7772400" cy="1102519"/>
+            <a:off x="685800" y="2130425"/>
+            <a:ext cx="7772400" cy="1470025"/>
           </a:xfrm>
         </p:spPr>
         <p:txBody>
           <a:bodyPr/>
           <a:lstStyle/>
           <a:p>
-            <a:pPr lvl="0" indent="0" marL="0">
+            <a:pPr marL="0" lvl="0" indent="0">
               <a:buNone/>
             </a:pPr>
             <a:r>
-              <a:rPr/>
               <a:t>Correlation of O3 and NO2 in Hessen</a:t>
             </a:r>
           </a:p>
@@ -3138,26 +3138,25 @@
             <a:spLocks noGrp="1"/>
           </p:cNvSpPr>
           <p:nvPr>
-            <p:ph idx="1" type="subTitle"/>
+            <p:ph type="subTitle" idx="1"/>
           </p:nvPr>
         </p:nvSpPr>
         <p:spPr>
           <a:xfrm>
-            <a:off x="1371600" y="2914650"/>
-            <a:ext cx="6400800" cy="1314450"/>
+            <a:off x="1371600" y="3886200"/>
+            <a:ext cx="6400800" cy="1752600"/>
           </a:xfrm>
         </p:spPr>
         <p:txBody>
           <a:bodyPr/>
           <a:lstStyle/>
           <a:p>
-            <a:pPr lvl="0" indent="0" marL="0">
+            <a:pPr marL="0" lvl="0" indent="0">
               <a:buNone/>
             </a:pPr>
             <a:br/>
             <a:br/>
             <a:r>
-              <a:rPr/>
               <a:t>Matthias Lochmann, HLNUG</a:t>
             </a:r>
           </a:p>
@@ -3170,26 +3169,28 @@
             <a:spLocks noGrp="1"/>
           </p:cNvSpPr>
           <p:nvPr>
-            <p:ph idx="10" sz="half" type="dt"/>
-          </p:nvPr>
-        </p:nvSpPr>
-        <p:spPr/>
-        <p:txBody>
-          <a:bodyPr/>
-          <a:lstStyle/>
-          <a:p>
-            <a:pPr lvl="0" indent="0" marL="0">
+            <p:ph type="dt" sz="half" idx="10"/>
+          </p:nvPr>
+        </p:nvSpPr>
+        <p:spPr/>
+        <p:txBody>
+          <a:bodyPr/>
+          <a:lstStyle/>
+          <a:p>
+            <a:pPr marL="0" lvl="0" indent="0">
               <a:buNone/>
             </a:pPr>
             <a:r>
-              <a:rPr/>
-              <a:t>2025-03-24</a:t>
+              <a:t>2025-04-02</a:t>
             </a:r>
           </a:p>
         </p:txBody>
       </p:sp>
     </p:spTree>
   </p:cSld>
+  <p:clrMapOvr>
+    <a:masterClrMapping/>
+  </p:clrMapOvr>
 </p:sld>
 </file>
 
@@ -3225,52 +3226,50 @@
           <a:bodyPr/>
           <a:lstStyle/>
           <a:p>
-            <a:pPr lvl="0" indent="0" marL="0">
+            <a:pPr marL="0" lvl="0" indent="0">
               <a:buNone/>
             </a:pPr>
             <a:r>
-              <a:rPr/>
-              <a:t>Conclusion</a:t>
-            </a:r>
-          </a:p>
-        </p:txBody>
-      </p:sp>
-      <p:sp>
-        <p:nvSpPr>
-          <p:cNvPr id="3" name="Content Placeholder 2"/>
-          <p:cNvSpPr>
-            <a:spLocks noGrp="1"/>
-          </p:cNvSpPr>
-          <p:nvPr>
-            <p:ph idx="1"/>
-          </p:nvPr>
-        </p:nvSpPr>
-        <p:spPr/>
-        <p:txBody>
-          <a:bodyPr/>
-          <a:lstStyle/>
-          <a:p>
-            <a:pPr lvl="0" indent="0" marL="0">
-              <a:buNone/>
-            </a:pPr>
-            <a:r>
-              <a:rPr/>
-              <a:t>The analysed data consists only of measurement data from Hessen, Germany and does not include O3 measurements at urban traffic sites. However, the observed anticorrelation might be representative for other regions with similar climate and emission patterns.</a:t>
-            </a:r>
-          </a:p>
-          <a:p>
-            <a:pPr lvl="0" indent="0" marL="0">
-              <a:buNone/>
-            </a:pPr>
-            <a:r>
-              <a:rPr/>
-              <a:t>Most probably, there might be a truly protective effects of NO2 via the destruction of O3. The negative slope of NO2 and relative risk of COPD (when using natural cubic spline method) is not necessarly wrong, when using a single pollutant model without confounder adjustment for O3.</a:t>
-            </a:r>
-          </a:p>
-        </p:txBody>
-      </p:sp>
+              <a:t>Daily resolution</a:t>
+            </a:r>
+          </a:p>
+        </p:txBody>
+      </p:sp>
+      <p:pic>
+        <p:nvPicPr>
+          <p:cNvPr id="3" name="Picture 1" descr="VglO3NO2_files/figure-pptx/dailyresolution-1.png"/>
+          <p:cNvPicPr>
+            <a:picLocks noGrp="1" noChangeAspect="1"/>
+          </p:cNvPicPr>
+          <p:nvPr/>
+        </p:nvPicPr>
+        <p:blipFill>
+          <a:blip r:embed="rId2"/>
+          <a:stretch>
+            <a:fillRect/>
+          </a:stretch>
+        </p:blipFill>
+        <p:spPr bwMode="auto">
+          <a:xfrm>
+            <a:off x="457200" y="1803400"/>
+            <a:ext cx="8229600" cy="4114800"/>
+          </a:xfrm>
+          <a:prstGeom prst="rect">
+            <a:avLst/>
+          </a:prstGeom>
+          <a:noFill/>
+          <a:ln w="9525">
+            <a:noFill/>
+            <a:headEnd/>
+            <a:tailEnd/>
+          </a:ln>
+        </p:spPr>
+      </p:pic>
     </p:spTree>
   </p:cSld>
+  <p:clrMapOvr>
+    <a:masterClrMapping/>
+  </p:clrMapOvr>
 </p:sld>
 </file>
 
@@ -3306,12 +3305,11 @@
           <a:bodyPr/>
           <a:lstStyle/>
           <a:p>
-            <a:pPr lvl="0" indent="0" marL="0">
+            <a:pPr marL="0" lvl="0" indent="0">
               <a:buNone/>
             </a:pPr>
             <a:r>
-              <a:rPr/>
-              <a:t>Thinking about counterfactual models</a:t>
+              <a:t>Conclusion</a:t>
             </a:r>
           </a:p>
         </p:txBody>
@@ -3328,28 +3326,43 @@
         </p:nvSpPr>
         <p:spPr/>
         <p:txBody>
-          <a:bodyPr/>
-          <a:lstStyle/>
-          <a:p>
-            <a:pPr lvl="0" indent="0" marL="0">
+          <a:bodyPr>
+            <a:noAutofit/>
+          </a:bodyPr>
+          <a:lstStyle/>
+          <a:p>
+            <a:pPr marL="0" lvl="0" indent="0">
               <a:buNone/>
             </a:pPr>
             <a:r>
-              <a:rPr/>
-              <a:t>When considering a re-analysis of the epidemiological data, it might be worth to consider, which counterfactual model to use.</a:t>
-            </a:r>
-          </a:p>
-          <a:p>
-            <a:pPr lvl="0"/>
-            <a:r>
-              <a:rPr/>
-              <a:t>single pollutant model, with counterfactual scenario NO2 concentration=0 or NO2 concentration=TMREL, but with O3 unchanged. This might be the classical epidemiological approach, however unrealistic, as O3 concentration would increase in real world scenarios.</a:t>
+              <a:rPr sz="2400" dirty="0"/>
+              <a:t>The </a:t>
+            </a:r>
+            <a:r>
+              <a:rPr sz="2400" dirty="0" err="1"/>
+              <a:t>analysed</a:t>
+            </a:r>
+            <a:r>
+              <a:rPr sz="2400" dirty="0"/>
+              <a:t> data consists only of measurement data from Hessen, Germany and does not include O3 measurements at urban traffic sites. However, the observed anticorrelation might be representative for other regions with similar climate and emission patterns.</a:t>
+            </a:r>
+          </a:p>
+          <a:p>
+            <a:pPr marL="0" lvl="0" indent="0">
+              <a:buNone/>
+            </a:pPr>
+            <a:r>
+              <a:rPr sz="2400" dirty="0"/>
+              <a:t>Most probably, there might be a truly protective effects of NO2 via the complex pathways of air chemistry to effectively reduce O3. The possibly negative slope of relative risk of COPD as a function of NO2 (when using natural cubic spline method) is not necessarily wrong, when using a single pollutant model without adjustment for the possible confounder O3.</a:t>
             </a:r>
           </a:p>
         </p:txBody>
       </p:sp>
     </p:spTree>
   </p:cSld>
+  <p:clrMapOvr>
+    <a:masterClrMapping/>
+  </p:clrMapOvr>
 </p:sld>
 </file>
 
@@ -3382,15 +3395,16 @@
         </p:nvSpPr>
         <p:spPr/>
         <p:txBody>
-          <a:bodyPr/>
-          <a:lstStyle/>
-          <a:p>
-            <a:pPr lvl="0" indent="0" marL="0">
+          <a:bodyPr>
+            <a:normAutofit fontScale="90000"/>
+          </a:bodyPr>
+          <a:lstStyle/>
+          <a:p>
+            <a:pPr marL="0" lvl="0" indent="0">
               <a:buNone/>
             </a:pPr>
             <a:r>
-              <a:rPr/>
-              <a:t>Counterfactual model with two pollutants</a:t>
+              <a:t>Thinking about counterfactual models</a:t>
             </a:r>
           </a:p>
         </p:txBody>
@@ -3407,26 +3421,112 @@
         </p:nvSpPr>
         <p:spPr/>
         <p:txBody>
-          <a:bodyPr/>
-          <a:lstStyle/>
-          <a:p>
-            <a:pPr lvl="0"/>
-            <a:r>
-              <a:rPr/>
-              <a:t>single pollutant model, with counterfactual scenario NO2 concentration=0 or NO2 concentration=TMREL, with rising O3 concentration. This might be a more realistic scenario, implicitly used in the analysed performed so far. However, the ERF should then be allowed to have a negative slope.</a:t>
-            </a:r>
-          </a:p>
-          <a:p>
-            <a:pPr lvl="0"/>
-            <a:r>
-              <a:rPr/>
-              <a:t>two pollutant model, with counterfactual scenario both NO2 and O3 concentration=0 or TMREL. This might be the most beautiful, however most unrealistic scenario.</a:t>
+          <a:bodyPr>
+            <a:normAutofit lnSpcReduction="10000"/>
+          </a:bodyPr>
+          <a:lstStyle/>
+          <a:p>
+            <a:pPr marL="0" lvl="0" indent="0">
+              <a:buNone/>
+            </a:pPr>
+            <a:r>
+              <a:t>When considering a re-analysis of the epidemiological data, it might be worth to consider, which counterfactual model to use.</a:t>
+            </a:r>
+          </a:p>
+          <a:p>
+            <a:pPr lvl="1"/>
+            <a:r>
+              <a:t>single pollutant model, with counterfactual scenario NO2 concentration=0 or NO2 concentration=TMREL, but with O3 unchanged. This might be the classical epidemiological approach, however unrealistic, as O3 concentration would increase in most real world scenarios.</a:t>
             </a:r>
           </a:p>
         </p:txBody>
       </p:sp>
     </p:spTree>
   </p:cSld>
+  <p:clrMapOvr>
+    <a:masterClrMapping/>
+  </p:clrMapOvr>
+</p:sld>
+</file>
+
+<file path=ppt/slides/slide13.xml><?xml version="1.0" encoding="utf-8"?>
+<p:sld xmlns:a="http://schemas.openxmlformats.org/drawingml/2006/main" xmlns:r="http://schemas.openxmlformats.org/officeDocument/2006/relationships" xmlns:p="http://schemas.openxmlformats.org/presentationml/2006/main">
+  <p:cSld>
+    <p:spTree>
+      <p:nvGrpSpPr>
+        <p:cNvPr id="1" name=""/>
+        <p:cNvGrpSpPr/>
+        <p:nvPr/>
+      </p:nvGrpSpPr>
+      <p:grpSpPr>
+        <a:xfrm>
+          <a:off x="0" y="0"/>
+          <a:ext cx="0" cy="0"/>
+          <a:chOff x="0" y="0"/>
+          <a:chExt cx="0" cy="0"/>
+        </a:xfrm>
+      </p:grpSpPr>
+      <p:sp>
+        <p:nvSpPr>
+          <p:cNvPr id="2" name="Title 1"/>
+          <p:cNvSpPr>
+            <a:spLocks noGrp="1"/>
+          </p:cNvSpPr>
+          <p:nvPr>
+            <p:ph type="title"/>
+          </p:nvPr>
+        </p:nvSpPr>
+        <p:spPr/>
+        <p:txBody>
+          <a:bodyPr>
+            <a:normAutofit fontScale="90000"/>
+          </a:bodyPr>
+          <a:lstStyle/>
+          <a:p>
+            <a:pPr marL="0" lvl="0" indent="0">
+              <a:buNone/>
+            </a:pPr>
+            <a:r>
+              <a:t>Counterfactual model with two pollutants</a:t>
+            </a:r>
+          </a:p>
+        </p:txBody>
+      </p:sp>
+      <p:sp>
+        <p:nvSpPr>
+          <p:cNvPr id="3" name="Content Placeholder 2"/>
+          <p:cNvSpPr>
+            <a:spLocks noGrp="1"/>
+          </p:cNvSpPr>
+          <p:nvPr>
+            <p:ph idx="1"/>
+          </p:nvPr>
+        </p:nvSpPr>
+        <p:spPr/>
+        <p:txBody>
+          <a:bodyPr>
+            <a:normAutofit lnSpcReduction="10000"/>
+          </a:bodyPr>
+          <a:lstStyle/>
+          <a:p>
+            <a:pPr lvl="1"/>
+            <a:r>
+              <a:t>single pollutant model, with counterfactual scenario NO2 concentration=0 or NO2 concentration=TMREL, with rising O3 concentration. This might be a more realistic scenario, implicitly used in the analysed performed so far. However, the ERF should then be allowed to have a negative slope.</a:t>
+            </a:r>
+          </a:p>
+          <a:p>
+            <a:pPr lvl="1"/>
+            <a:r>
+              <a:t>two pollutant model, with counterfactual scenario both NO2 and O3 concentration=0 or TMREL. This might be the most beautiful, however most unrealistic scenario.</a:t>
+            </a:r>
+          </a:p>
+        </p:txBody>
+      </p:sp>
+    </p:spTree>
+  </p:cSld>
+  <p:clrMapOvr>
+    <a:masterClrMapping/>
+  </p:clrMapOvr>
 </p:sld>
 </file>
 
@@ -3462,11 +3562,10 @@
           <a:bodyPr/>
           <a:lstStyle/>
           <a:p>
-            <a:pPr lvl="0" indent="0" marL="0">
+            <a:pPr marL="0" lvl="0" indent="0">
               <a:buNone/>
             </a:pPr>
             <a:r>
-              <a:rPr/>
               <a:t>Impressum</a:t>
             </a:r>
           </a:p>
@@ -3487,11 +3586,10 @@
           <a:bodyPr/>
           <a:lstStyle/>
           <a:p>
-            <a:pPr lvl="0" indent="0" marL="0">
+            <a:pPr marL="0" lvl="0" indent="0">
               <a:buNone/>
             </a:pPr>
             <a:r>
-              <a:rPr/>
               <a:t>All measurement data in this document is available from </a:t>
             </a:r>
             <a:r>
@@ -3501,7 +3599,6 @@
               <a:t>https://www.hlnug.de/messwerte/datenportal/luftmessnetz</a:t>
             </a:r>
             <a:r>
-              <a:rPr/>
               <a:t>. The analysis is maintained at </a:t>
             </a:r>
             <a:r>
@@ -3511,14 +3608,16 @@
               <a:t>https://github.com/Ma-Loma/Antikor.git</a:t>
             </a:r>
             <a:r>
-              <a:rPr/>
-              <a:t> and was performed by Matthias Lochmann (HLNUG) on 2025-03-24.</a:t>
+              <a:t> and was performed by Matthias Lochmann (HLNUG) on 2025-04-02.</a:t>
             </a:r>
           </a:p>
         </p:txBody>
       </p:sp>
     </p:spTree>
   </p:cSld>
+  <p:clrMapOvr>
+    <a:masterClrMapping/>
+  </p:clrMapOvr>
 </p:sld>
 </file>
 
@@ -3549,21 +3648,15 @@
             <p:ph type="title"/>
           </p:nvPr>
         </p:nvSpPr>
-        <p:spPr>
-          <a:xfrm>
-            <a:off x="457201" y="204787"/>
-            <a:ext cx="3008313" cy="871538"/>
-          </a:xfrm>
-        </p:spPr>
-        <p:txBody>
-          <a:bodyPr/>
-          <a:lstStyle/>
-          <a:p>
-            <a:pPr lvl="0" indent="0" marL="0">
+        <p:spPr/>
+        <p:txBody>
+          <a:bodyPr/>
+          <a:lstStyle/>
+          <a:p>
+            <a:pPr marL="0" lvl="0" indent="0">
               <a:buNone/>
             </a:pPr>
             <a:r>
-              <a:rPr/>
               <a:t>Motivation</a:t>
             </a:r>
           </a:p>
@@ -3571,61 +3664,35 @@
       </p:sp>
       <p:sp>
         <p:nvSpPr>
-          <p:cNvPr id="4" name="Text Placeholder 3"/>
-          <p:cNvSpPr>
-            <a:spLocks noGrp="1"/>
-          </p:cNvSpPr>
-          <p:nvPr>
-            <p:ph idx="2" sz="half" type="body"/>
-          </p:nvPr>
-        </p:nvSpPr>
-        <p:spPr/>
-        <p:txBody>
-          <a:bodyPr/>
-          <a:lstStyle/>
-          <a:p>
-            <a:pPr lvl="0" indent="0" marL="0">
+          <p:cNvPr id="3" name="Content Placeholder 2"/>
+          <p:cNvSpPr>
+            <a:spLocks noGrp="1"/>
+          </p:cNvSpPr>
+          <p:nvPr>
+            <p:ph idx="1"/>
+          </p:nvPr>
+        </p:nvSpPr>
+        <p:spPr/>
+        <p:txBody>
+          <a:bodyPr>
+            <a:normAutofit lnSpcReduction="10000"/>
+          </a:bodyPr>
+          <a:lstStyle/>
+          <a:p>
+            <a:pPr marL="0" lvl="0" indent="0">
               <a:buNone/>
             </a:pPr>
             <a:r>
-              <a:rPr/>
-              <a:t>In the burden-eu webinar with title “Establishing new exposure-response functions for air pollutants and environmental noise”, the results of different metaanalyses on NO2 and relative risk of COPD were presented. Depending on the analysis methods and constraints, the risk might have a negative slope. However, this might be due to the correlation of NO2 with O3. As it is likely, that O3 increases the risk of COPD, the negative slope might be due to the correlation of NO2 with O3. This presentation will show the correlation of NO2 and O3 in Hessen (Germany).</a:t>
-            </a:r>
-          </a:p>
-        </p:txBody>
-      </p:sp>
-      <p:pic>
-        <p:nvPicPr>
-          <p:cNvPr descr="img/BestCostScreenshot.png" id="0" name="Picture 1"/>
-          <p:cNvPicPr>
-            <a:picLocks noGrp="1" noChangeAspect="1"/>
-          </p:cNvPicPr>
-          <p:nvPr/>
-        </p:nvPicPr>
-        <p:blipFill>
-          <a:blip r:embed="rId2"/>
-          <a:stretch>
-            <a:fillRect/>
-          </a:stretch>
-        </p:blipFill>
-        <p:spPr bwMode="auto">
-          <a:xfrm>
-            <a:off x="3568700" y="990600"/>
-            <a:ext cx="5105400" cy="2819400"/>
-          </a:xfrm>
-          <a:prstGeom prst="rect">
-            <a:avLst/>
-          </a:prstGeom>
-          <a:noFill/>
-          <a:ln w="9525">
-            <a:noFill/>
-            <a:headEnd/>
-            <a:tailEnd/>
-          </a:ln>
-        </p:spPr>
-      </p:pic>
+              <a:t>The next slide is a screenshot of the burden-eu webinar with title “Establishing new exposure-response functions for air pollutants and environmental noise”: the results of different metaanalyses on NO2 and relative risk of COPD. The natural cubic spline method without constraints might indicate a negative slope. As it is likely, that O3 increases the risk of COPD, this might be due to the (anti)correlation of NO2 with O3 (via complex pathways of air chemistry).</a:t>
+            </a:r>
+          </a:p>
+        </p:txBody>
+      </p:sp>
     </p:spTree>
   </p:cSld>
+  <p:clrMapOvr>
+    <a:masterClrMapping/>
+  </p:clrMapOvr>
 </p:sld>
 </file>
 
@@ -3646,58 +3713,41 @@
           <a:chExt cx="0" cy="0"/>
         </a:xfrm>
       </p:grpSpPr>
-      <p:sp>
-        <p:nvSpPr>
-          <p:cNvPr id="2" name="Title 1"/>
-          <p:cNvSpPr>
-            <a:spLocks noGrp="1"/>
-          </p:cNvSpPr>
-          <p:nvPr>
-            <p:ph type="title"/>
-          </p:nvPr>
-        </p:nvSpPr>
-        <p:spPr/>
-        <p:txBody>
-          <a:bodyPr/>
-          <a:lstStyle/>
-          <a:p>
-            <a:pPr lvl="0" indent="0" marL="0">
-              <a:buNone/>
-            </a:pPr>
-            <a:r>
-              <a:rPr/>
-              <a:t>Measurements from Hessen</a:t>
-            </a:r>
-          </a:p>
-        </p:txBody>
-      </p:sp>
-      <p:sp>
-        <p:nvSpPr>
-          <p:cNvPr id="3" name="Content Placeholder 2"/>
-          <p:cNvSpPr>
-            <a:spLocks noGrp="1"/>
-          </p:cNvSpPr>
-          <p:nvPr>
-            <p:ph idx="1"/>
-          </p:nvPr>
-        </p:nvSpPr>
-        <p:spPr/>
-        <p:txBody>
-          <a:bodyPr/>
-          <a:lstStyle/>
-          <a:p>
-            <a:pPr lvl="0" indent="0" marL="0">
-              <a:buNone/>
-            </a:pPr>
-            <a:r>
-              <a:rPr/>
-              <a:t>The next graph shows the annual averages of measured NO2 and O3 concentrations since 2005. The measurement site categories are symbolized as different colors. O3 is measured at all “Rural Background” sites, at most “Urban Background” sites, but not at “Urban Traffic” sites.</a:t>
-            </a:r>
-          </a:p>
-        </p:txBody>
-      </p:sp>
+      <p:pic>
+        <p:nvPicPr>
+          <p:cNvPr id="2" name="Picture 1" descr="img/BestCostScreenshot.png"/>
+          <p:cNvPicPr>
+            <a:picLocks noGrp="1" noChangeAspect="1"/>
+          </p:cNvPicPr>
+          <p:nvPr/>
+        </p:nvPicPr>
+        <p:blipFill>
+          <a:blip r:embed="rId2"/>
+          <a:stretch>
+            <a:fillRect/>
+          </a:stretch>
+        </p:blipFill>
+        <p:spPr bwMode="auto">
+          <a:xfrm>
+            <a:off x="469900" y="1600200"/>
+            <a:ext cx="8191500" cy="4521200"/>
+          </a:xfrm>
+          <a:prstGeom prst="rect">
+            <a:avLst/>
+          </a:prstGeom>
+          <a:noFill/>
+          <a:ln w="9525">
+            <a:noFill/>
+            <a:headEnd/>
+            <a:tailEnd/>
+          </a:ln>
+        </p:spPr>
+      </p:pic>
     </p:spTree>
   </p:cSld>
+  <p:clrMapOvr>
+    <a:masterClrMapping/>
+  </p:clrMapOvr>
 </p:sld>
 </file>
 
@@ -3733,48 +3783,44 @@
           <a:bodyPr/>
           <a:lstStyle/>
           <a:p>
-            <a:pPr lvl="0" indent="0" marL="0">
+            <a:pPr marL="0" lvl="0" indent="0">
               <a:buNone/>
             </a:pPr>
             <a:r>
-              <a:rPr/>
-              <a:t>NO2 and O3 yearly averages</a:t>
-            </a:r>
-          </a:p>
-        </p:txBody>
-      </p:sp>
-      <p:pic>
-        <p:nvPicPr>
-          <p:cNvPr descr="VglO3NO2_files/figure-pptx/jahresmittelverlauf-1.png" id="0" name="Picture 1"/>
-          <p:cNvPicPr>
-            <a:picLocks noGrp="1" noChangeAspect="1"/>
-          </p:cNvPicPr>
-          <p:nvPr/>
-        </p:nvPicPr>
-        <p:blipFill>
-          <a:blip r:embed="rId2"/>
-          <a:stretch>
-            <a:fillRect/>
-          </a:stretch>
-        </p:blipFill>
-        <p:spPr bwMode="auto">
-          <a:xfrm>
-            <a:off x="1181100" y="1193800"/>
-            <a:ext cx="6781800" cy="3390900"/>
-          </a:xfrm>
-          <a:prstGeom prst="rect">
-            <a:avLst/>
-          </a:prstGeom>
-          <a:noFill/>
-          <a:ln w="9525">
-            <a:noFill/>
-            <a:headEnd/>
-            <a:tailEnd/>
-          </a:ln>
-        </p:spPr>
-      </p:pic>
+              <a:t>Measurements from Hessen</a:t>
+            </a:r>
+          </a:p>
+        </p:txBody>
+      </p:sp>
+      <p:sp>
+        <p:nvSpPr>
+          <p:cNvPr id="3" name="Content Placeholder 2"/>
+          <p:cNvSpPr>
+            <a:spLocks noGrp="1"/>
+          </p:cNvSpPr>
+          <p:nvPr>
+            <p:ph idx="1"/>
+          </p:nvPr>
+        </p:nvSpPr>
+        <p:spPr/>
+        <p:txBody>
+          <a:bodyPr/>
+          <a:lstStyle/>
+          <a:p>
+            <a:pPr marL="0" lvl="0" indent="0">
+              <a:buNone/>
+            </a:pPr>
+            <a:r>
+              <a:t>This presentation will show the observed correlation of NO2 and O3 in Hessen (Germany). The next graph shows the annual averages of measured NO2 and O3 concentrations since 2005. The measurement site categories are symbolized as different colors. O3 is measured at all “Rural Background” sites, at most “Urban Background” sites, but not at “Urban Traffic” sites.</a:t>
+            </a:r>
+          </a:p>
+        </p:txBody>
+      </p:sp>
     </p:spTree>
   </p:cSld>
+  <p:clrMapOvr>
+    <a:masterClrMapping/>
+  </p:clrMapOvr>
 </p:sld>
 </file>
 
@@ -3810,97 +3856,50 @@
           <a:bodyPr/>
           <a:lstStyle/>
           <a:p>
-            <a:pPr lvl="0" indent="0" marL="0">
+            <a:pPr marL="0" lvl="0" indent="0">
               <a:buNone/>
             </a:pPr>
             <a:r>
-              <a:rPr/>
-              <a:t>Correlation of NO2 and O3</a:t>
-            </a:r>
-          </a:p>
-        </p:txBody>
-      </p:sp>
-      <mc:AlternateContent xmlns:mc="http://schemas.openxmlformats.org/markup-compatibility/2006">
-        <mc:Choice xmlns:a14="http://schemas.microsoft.com/office/drawing/2010/main" Requires="a14">
-          <p:sp>
-            <p:nvSpPr>
-              <p:cNvPr id="3" name="Content Placeholder 2"/>
-              <p:cNvSpPr>
-                <a:spLocks noGrp="1"/>
-              </p:cNvSpPr>
-              <p:nvPr>
-                <p:ph idx="1"/>
-              </p:nvPr>
-            </p:nvSpPr>
-            <p:spPr/>
-            <p:txBody>
-              <a:bodyPr/>
-              <a:lstStyle/>
-              <a:p>
-                <a:pPr lvl="0" indent="0" marL="0">
-                  <a:buNone/>
-                </a:pPr>
-                <a:r>
-                  <a:rPr/>
-                  <a:t>The next scatterplot of yearly average values since 2005 shows a strong negative correlation of concentrations of NO2 and O3. The red lines are simple two parameter fits with </a:t>
-                </a:r>
-                <a14:m>
-                  <m:oMath xmlns:m="http://schemas.openxmlformats.org/officeDocument/2006/math">
-                    <m:r>
-                      <m:t>O</m:t>
-                    </m:r>
-                    <m:r>
-                      <m:t>3</m:t>
-                    </m:r>
-                    <m:r>
-                      <m:rPr>
-                        <m:sty m:val="p"/>
-                      </m:rPr>
-                      <m:t>=</m:t>
-                    </m:r>
-                    <m:f>
-                      <m:fPr>
-                        <m:type m:val="bar"/>
-                      </m:fPr>
-                      <m:num>
-                        <m:r>
-                          <m:t>a</m:t>
-                        </m:r>
-                      </m:num>
-                      <m:den>
-                        <m:r>
-                          <m:t>N</m:t>
-                        </m:r>
-                        <m:r>
-                          <m:t>O</m:t>
-                        </m:r>
-                        <m:r>
-                          <m:t>2</m:t>
-                        </m:r>
-                      </m:den>
-                    </m:f>
-                    <m:r>
-                      <m:rPr>
-                        <m:sty m:val="p"/>
-                      </m:rPr>
-                      <m:t>+</m:t>
-                    </m:r>
-                    <m:r>
-                      <m:t>b</m:t>
-                    </m:r>
-                  </m:oMath>
-                </a14:m>
-                <a:r>
-                  <a:rPr/>
-                  <a:t>. As some stations are only measuring NO2, the data are not included in the fit. However these NO2 datapoints are included in the plot, with the O3 missing values artificially set to 30 or 31 µg/m³, for “Urban Traffic” and “Urban Background” sites respectively. (The graph is faceted and color coded by year, to make visible the time trend. The time trend might be interesting, but is not the main focus of this analysis.)</a:t>
-                </a:r>
-              </a:p>
-            </p:txBody>
-          </p:sp>
-        </mc:Choice>
-      </mc:AlternateContent>
+              <a:t>NO2 and O3 yearly averages</a:t>
+            </a:r>
+          </a:p>
+        </p:txBody>
+      </p:sp>
+      <p:pic>
+        <p:nvPicPr>
+          <p:cNvPr id="3" name="Picture 1" descr="VglO3NO2_files/figure-pptx/jahresmittelverlauf-1.png"/>
+          <p:cNvPicPr>
+            <a:picLocks noGrp="1" noChangeAspect="1"/>
+          </p:cNvPicPr>
+          <p:nvPr/>
+        </p:nvPicPr>
+        <p:blipFill>
+          <a:blip r:embed="rId2"/>
+          <a:stretch>
+            <a:fillRect/>
+          </a:stretch>
+        </p:blipFill>
+        <p:spPr bwMode="auto">
+          <a:xfrm>
+            <a:off x="457200" y="1803400"/>
+            <a:ext cx="8229600" cy="4114800"/>
+          </a:xfrm>
+          <a:prstGeom prst="rect">
+            <a:avLst/>
+          </a:prstGeom>
+          <a:noFill/>
+          <a:ln w="9525">
+            <a:noFill/>
+            <a:headEnd/>
+            <a:tailEnd/>
+          </a:ln>
+        </p:spPr>
+      </p:pic>
     </p:spTree>
   </p:cSld>
+  <p:clrMapOvr>
+    <a:masterClrMapping/>
+  </p:clrMapOvr>
 </p:sld>
 </file>
 
@@ -3936,48 +3935,145 @@
           <a:bodyPr/>
           <a:lstStyle/>
           <a:p>
-            <a:pPr lvl="0" indent="0" marL="0">
+            <a:pPr marL="0" lvl="0" indent="0">
               <a:buNone/>
             </a:pPr>
             <a:r>
-              <a:rPr/>
               <a:t>Correlation of NO2 and O3</a:t>
             </a:r>
           </a:p>
         </p:txBody>
       </p:sp>
-      <p:pic>
-        <p:nvPicPr>
-          <p:cNvPr descr="VglO3NO2_files/figure-pptx/jahresmittelcorrelation-1.png" id="0" name="Picture 1"/>
-          <p:cNvPicPr>
-            <a:picLocks noGrp="1" noChangeAspect="1"/>
-          </p:cNvPicPr>
-          <p:nvPr/>
-        </p:nvPicPr>
-        <p:blipFill>
-          <a:blip r:embed="rId2"/>
-          <a:stretch>
-            <a:fillRect/>
-          </a:stretch>
-        </p:blipFill>
-        <p:spPr bwMode="auto">
-          <a:xfrm>
-            <a:off x="1181100" y="1193800"/>
-            <a:ext cx="6781800" cy="3390900"/>
-          </a:xfrm>
-          <a:prstGeom prst="rect">
-            <a:avLst/>
-          </a:prstGeom>
-          <a:noFill/>
-          <a:ln w="9525">
-            <a:noFill/>
-            <a:headEnd/>
-            <a:tailEnd/>
-          </a:ln>
-        </p:spPr>
-      </p:pic>
+      <mc:AlternateContent xmlns:mc="http://schemas.openxmlformats.org/markup-compatibility/2006">
+        <mc:Choice xmlns:a14="http://schemas.microsoft.com/office/drawing/2010/main" Requires="a14">
+          <p:sp>
+            <p:nvSpPr>
+              <p:cNvPr id="3" name="Content Placeholder 2"/>
+              <p:cNvSpPr>
+                <a:spLocks noGrp="1"/>
+              </p:cNvSpPr>
+              <p:nvPr>
+                <p:ph idx="1"/>
+              </p:nvPr>
+            </p:nvSpPr>
+            <p:spPr/>
+            <p:txBody>
+              <a:bodyPr>
+                <a:normAutofit fontScale="85000" lnSpcReduction="10000"/>
+              </a:bodyPr>
+              <a:lstStyle/>
+              <a:p>
+                <a:pPr marL="0" lvl="0" indent="0">
+                  <a:buNone/>
+                </a:pPr>
+                <a:r>
+                  <a:t>The next scatterplot of yearly average values since 2005 shows a strong negative correlation of concentrations of NO2 and O3. The red lines are simple two parameter fits with </a:t>
+                </a:r>
+                <a14:m>
+                  <m:oMath xmlns:m="http://schemas.openxmlformats.org/officeDocument/2006/math">
+                    <m:r>
+                      <a:rPr>
+                        <a:latin typeface="Cambria Math" panose="02040503050406030204" pitchFamily="18" charset="0"/>
+                      </a:rPr>
+                      <m:t>𝑂</m:t>
+                    </m:r>
+                    <m:r>
+                      <a:rPr>
+                        <a:latin typeface="Cambria Math" panose="02040503050406030204" pitchFamily="18" charset="0"/>
+                      </a:rPr>
+                      <m:t>3=</m:t>
+                    </m:r>
+                    <m:f>
+                      <m:fPr>
+                        <m:ctrlPr>
+                          <a:rPr i="1">
+                            <a:latin typeface="Cambria Math" panose="02040503050406030204" pitchFamily="18" charset="0"/>
+                          </a:rPr>
+                        </m:ctrlPr>
+                      </m:fPr>
+                      <m:num>
+                        <m:r>
+                          <a:rPr>
+                            <a:latin typeface="Cambria Math" panose="02040503050406030204" pitchFamily="18" charset="0"/>
+                          </a:rPr>
+                          <m:t>𝑎</m:t>
+                        </m:r>
+                      </m:num>
+                      <m:den>
+                        <m:r>
+                          <a:rPr>
+                            <a:latin typeface="Cambria Math" panose="02040503050406030204" pitchFamily="18" charset="0"/>
+                          </a:rPr>
+                          <m:t>𝑁𝑂</m:t>
+                        </m:r>
+                        <m:r>
+                          <a:rPr>
+                            <a:latin typeface="Cambria Math" panose="02040503050406030204" pitchFamily="18" charset="0"/>
+                          </a:rPr>
+                          <m:t>2</m:t>
+                        </m:r>
+                      </m:den>
+                    </m:f>
+                    <m:r>
+                      <a:rPr>
+                        <a:latin typeface="Cambria Math" panose="02040503050406030204" pitchFamily="18" charset="0"/>
+                      </a:rPr>
+                      <m:t>+</m:t>
+                    </m:r>
+                    <m:r>
+                      <a:rPr>
+                        <a:latin typeface="Cambria Math" panose="02040503050406030204" pitchFamily="18" charset="0"/>
+                      </a:rPr>
+                      <m:t>𝑏</m:t>
+                    </m:r>
+                  </m:oMath>
+                </a14:m>
+                <a:r>
+                  <a:t>. As some stations are only measuring NO2, the data are not included in the fit. However these NO2 datapoints are included in the plot, with the O3 missing values artificially set to 30 or 31 µg/m³, for “Urban Traffic” and “Urban Background” sites respectively. (The graph is faceted and color coded by year, to make visible the time trend. The time trend might be interesting, but is not the main focus of this analysis.)</a:t>
+                </a:r>
+              </a:p>
+            </p:txBody>
+          </p:sp>
+        </mc:Choice>
+        <mc:Fallback>
+          <p:sp>
+            <p:nvSpPr>
+              <p:cNvPr id="3" name="Content Placeholder 2"/>
+              <p:cNvSpPr>
+                <a:spLocks noGrp="1" noRot="1" noChangeAspect="1" noMove="1" noResize="1" noEditPoints="1" noAdjustHandles="1" noChangeArrowheads="1" noChangeShapeType="1" noTextEdit="1"/>
+              </p:cNvSpPr>
+              <p:nvPr>
+                <p:ph idx="1"/>
+              </p:nvPr>
+            </p:nvSpPr>
+            <p:spPr>
+              <a:blipFill>
+                <a:blip r:embed="rId2"/>
+                <a:stretch>
+                  <a:fillRect l="-1407" t="-2156" r="-2074"/>
+                </a:stretch>
+              </a:blipFill>
+            </p:spPr>
+            <p:txBody>
+              <a:bodyPr/>
+              <a:lstStyle/>
+              <a:p>
+                <a:r>
+                  <a:rPr lang="de-DE">
+                    <a:noFill/>
+                  </a:rPr>
+                  <a:t> </a:t>
+                </a:r>
+              </a:p>
+            </p:txBody>
+          </p:sp>
+        </mc:Fallback>
+      </mc:AlternateContent>
     </p:spTree>
   </p:cSld>
+  <p:clrMapOvr>
+    <a:masterClrMapping/>
+  </p:clrMapOvr>
 </p:sld>
 </file>
 
@@ -4013,97 +4109,50 @@
           <a:bodyPr/>
           <a:lstStyle/>
           <a:p>
-            <a:pPr lvl="0" indent="0" marL="0">
+            <a:pPr marL="0" lvl="0" indent="0">
               <a:buNone/>
             </a:pPr>
             <a:r>
-              <a:rPr/>
-              <a:t>Daily resolution</a:t>
-            </a:r>
-          </a:p>
-        </p:txBody>
-      </p:sp>
-      <mc:AlternateContent xmlns:mc="http://schemas.openxmlformats.org/markup-compatibility/2006">
-        <mc:Choice xmlns:a14="http://schemas.microsoft.com/office/drawing/2010/main" Requires="a14">
-          <p:sp>
-            <p:nvSpPr>
-              <p:cNvPr id="3" name="Content Placeholder 2"/>
-              <p:cNvSpPr>
-                <a:spLocks noGrp="1"/>
-              </p:cNvSpPr>
-              <p:nvPr>
-                <p:ph idx="1"/>
-              </p:nvPr>
-            </p:nvSpPr>
-            <p:spPr/>
-            <p:txBody>
-              <a:bodyPr/>
-              <a:lstStyle/>
-              <a:p>
-                <a:pPr lvl="0" indent="0" marL="0">
-                  <a:buNone/>
-                </a:pPr>
-                <a:r>
-                  <a:rPr/>
-                  <a:t>The longterm epidemiological studies are based on yearly averages. However, the next scatterplot of measured NO2 and O3 concentrations with daily resolution might give insights on air-chemistry dynamics. Most of the facets (measurement site category and season) show similar negative correlation. Again, the red lines are simple two parameter fits with </a:t>
-                </a:r>
-                <a14:m>
-                  <m:oMath xmlns:m="http://schemas.openxmlformats.org/officeDocument/2006/math">
-                    <m:r>
-                      <m:t>O</m:t>
-                    </m:r>
-                    <m:r>
-                      <m:t>3</m:t>
-                    </m:r>
-                    <m:r>
-                      <m:rPr>
-                        <m:sty m:val="p"/>
-                      </m:rPr>
-                      <m:t>=</m:t>
-                    </m:r>
-                    <m:f>
-                      <m:fPr>
-                        <m:type m:val="bar"/>
-                      </m:fPr>
-                      <m:num>
-                        <m:r>
-                          <m:t>a</m:t>
-                        </m:r>
-                      </m:num>
-                      <m:den>
-                        <m:r>
-                          <m:t>N</m:t>
-                        </m:r>
-                        <m:r>
-                          <m:t>O</m:t>
-                        </m:r>
-                        <m:r>
-                          <m:t>2</m:t>
-                        </m:r>
-                      </m:den>
-                    </m:f>
-                    <m:r>
-                      <m:rPr>
-                        <m:sty m:val="p"/>
-                      </m:rPr>
-                      <m:t>+</m:t>
-                    </m:r>
-                    <m:r>
-                      <m:t>b</m:t>
-                    </m:r>
-                  </m:oMath>
-                </a14:m>
-                <a:r>
-                  <a:rPr/>
-                  <a:t>. Obviously, it does not describe the data as well as the yearly data, but still illustrates the anti-correlation of NO2 and O3. (Again, the time is color coded, but not the main focus of the analysis.)</a:t>
-                </a:r>
-              </a:p>
-            </p:txBody>
-          </p:sp>
-        </mc:Choice>
-      </mc:AlternateContent>
+              <a:t>Correlation of NO2 and O3</a:t>
+            </a:r>
+          </a:p>
+        </p:txBody>
+      </p:sp>
+      <p:pic>
+        <p:nvPicPr>
+          <p:cNvPr id="3" name="Picture 1" descr="VglO3NO2_files/figure-pptx/jahresmittelcorrelation-1.png"/>
+          <p:cNvPicPr>
+            <a:picLocks noGrp="1" noChangeAspect="1"/>
+          </p:cNvPicPr>
+          <p:nvPr/>
+        </p:nvPicPr>
+        <p:blipFill>
+          <a:blip r:embed="rId2"/>
+          <a:stretch>
+            <a:fillRect/>
+          </a:stretch>
+        </p:blipFill>
+        <p:spPr bwMode="auto">
+          <a:xfrm>
+            <a:off x="457200" y="1803400"/>
+            <a:ext cx="8229600" cy="4114800"/>
+          </a:xfrm>
+          <a:prstGeom prst="rect">
+            <a:avLst/>
+          </a:prstGeom>
+          <a:noFill/>
+          <a:ln w="9525">
+            <a:noFill/>
+            <a:headEnd/>
+            <a:tailEnd/>
+          </a:ln>
+        </p:spPr>
+      </p:pic>
     </p:spTree>
   </p:cSld>
+  <p:clrMapOvr>
+    <a:masterClrMapping/>
+  </p:clrMapOvr>
 </p:sld>
 </file>
 
@@ -4139,48 +4188,155 @@
           <a:bodyPr/>
           <a:lstStyle/>
           <a:p>
-            <a:pPr lvl="0" indent="0" marL="0">
+            <a:pPr marL="0" lvl="0" indent="0">
               <a:buNone/>
             </a:pPr>
             <a:r>
-              <a:rPr/>
               <a:t>Daily resolution</a:t>
             </a:r>
           </a:p>
         </p:txBody>
       </p:sp>
-      <p:pic>
-        <p:nvPicPr>
-          <p:cNvPr descr="VglO3NO2_files/figure-pptx/dailyresolution-1.png" id="0" name="Picture 1"/>
-          <p:cNvPicPr>
-            <a:picLocks noGrp="1" noChangeAspect="1"/>
-          </p:cNvPicPr>
-          <p:nvPr/>
-        </p:nvPicPr>
-        <p:blipFill>
-          <a:blip r:embed="rId2"/>
-          <a:stretch>
-            <a:fillRect/>
-          </a:stretch>
-        </p:blipFill>
-        <p:spPr bwMode="auto">
-          <a:xfrm>
-            <a:off x="1181100" y="1193800"/>
-            <a:ext cx="6781800" cy="3390900"/>
-          </a:xfrm>
-          <a:prstGeom prst="rect">
-            <a:avLst/>
-          </a:prstGeom>
-          <a:noFill/>
-          <a:ln w="9525">
-            <a:noFill/>
-            <a:headEnd/>
-            <a:tailEnd/>
-          </a:ln>
-        </p:spPr>
-      </p:pic>
+      <mc:AlternateContent xmlns:mc="http://schemas.openxmlformats.org/markup-compatibility/2006">
+        <mc:Choice xmlns:a14="http://schemas.microsoft.com/office/drawing/2010/main" Requires="a14">
+          <p:sp>
+            <p:nvSpPr>
+              <p:cNvPr id="3" name="Content Placeholder 2"/>
+              <p:cNvSpPr>
+                <a:spLocks noGrp="1"/>
+              </p:cNvSpPr>
+              <p:nvPr>
+                <p:ph idx="1"/>
+              </p:nvPr>
+            </p:nvSpPr>
+            <p:spPr/>
+            <p:txBody>
+              <a:bodyPr>
+                <a:noAutofit/>
+              </a:bodyPr>
+              <a:lstStyle/>
+              <a:p>
+                <a:pPr marL="0" lvl="0" indent="0">
+                  <a:buNone/>
+                </a:pPr>
+                <a:r>
+                  <a:rPr sz="2400" dirty="0"/>
+                  <a:t>The </a:t>
+                </a:r>
+                <a:r>
+                  <a:rPr sz="2400" dirty="0" err="1"/>
+                  <a:t>longterm</a:t>
+                </a:r>
+                <a:r>
+                  <a:rPr sz="2400" dirty="0"/>
+                  <a:t> epidemiological studies are based on yearly averages. However, the next scatterplot of measured NO2 and O3 concentrations with daily resolution might give insights on air-chemistry dynamics. Most of the facets (measurement site category and season) show similar negative correlation. Again, the red lines are simple two parameter fits with </a:t>
+                </a:r>
+                <a14:m>
+                  <m:oMath xmlns:m="http://schemas.openxmlformats.org/officeDocument/2006/math">
+                    <m:r>
+                      <a:rPr sz="2400">
+                        <a:latin typeface="Cambria Math" panose="02040503050406030204" pitchFamily="18" charset="0"/>
+                      </a:rPr>
+                      <m:t>𝑂</m:t>
+                    </m:r>
+                    <m:r>
+                      <a:rPr sz="2400">
+                        <a:latin typeface="Cambria Math" panose="02040503050406030204" pitchFamily="18" charset="0"/>
+                      </a:rPr>
+                      <m:t>3=</m:t>
+                    </m:r>
+                    <m:f>
+                      <m:fPr>
+                        <m:ctrlPr>
+                          <a:rPr sz="2400" i="1">
+                            <a:latin typeface="Cambria Math" panose="02040503050406030204" pitchFamily="18" charset="0"/>
+                          </a:rPr>
+                        </m:ctrlPr>
+                      </m:fPr>
+                      <m:num>
+                        <m:r>
+                          <a:rPr sz="2400">
+                            <a:latin typeface="Cambria Math" panose="02040503050406030204" pitchFamily="18" charset="0"/>
+                          </a:rPr>
+                          <m:t>𝑎</m:t>
+                        </m:r>
+                      </m:num>
+                      <m:den>
+                        <m:r>
+                          <a:rPr sz="2400">
+                            <a:latin typeface="Cambria Math" panose="02040503050406030204" pitchFamily="18" charset="0"/>
+                          </a:rPr>
+                          <m:t>𝑁𝑂</m:t>
+                        </m:r>
+                        <m:r>
+                          <a:rPr sz="2400">
+                            <a:latin typeface="Cambria Math" panose="02040503050406030204" pitchFamily="18" charset="0"/>
+                          </a:rPr>
+                          <m:t>2</m:t>
+                        </m:r>
+                      </m:den>
+                    </m:f>
+                    <m:r>
+                      <a:rPr sz="2400">
+                        <a:latin typeface="Cambria Math" panose="02040503050406030204" pitchFamily="18" charset="0"/>
+                      </a:rPr>
+                      <m:t>+</m:t>
+                    </m:r>
+                    <m:r>
+                      <a:rPr sz="2400">
+                        <a:latin typeface="Cambria Math" panose="02040503050406030204" pitchFamily="18" charset="0"/>
+                      </a:rPr>
+                      <m:t>𝑏</m:t>
+                    </m:r>
+                  </m:oMath>
+                </a14:m>
+                <a:r>
+                  <a:rPr sz="2400" dirty="0"/>
+                  <a:t>. Obviously, it does not describe the data as well as the yearly data, but still illustrates the anti-correlation of NO2 and O3. (Again, the time is color coded, but not the main focus of the analysis.)</a:t>
+                </a:r>
+              </a:p>
+            </p:txBody>
+          </p:sp>
+        </mc:Choice>
+        <mc:Fallback>
+          <p:sp>
+            <p:nvSpPr>
+              <p:cNvPr id="3" name="Content Placeholder 2"/>
+              <p:cNvSpPr>
+                <a:spLocks noGrp="1" noRot="1" noChangeAspect="1" noMove="1" noResize="1" noEditPoints="1" noAdjustHandles="1" noChangeArrowheads="1" noChangeShapeType="1" noTextEdit="1"/>
+              </p:cNvSpPr>
+              <p:nvPr>
+                <p:ph idx="1"/>
+              </p:nvPr>
+            </p:nvSpPr>
+            <p:spPr>
+              <a:blipFill>
+                <a:blip r:embed="rId2"/>
+                <a:stretch>
+                  <a:fillRect l="-1111" t="-1078"/>
+                </a:stretch>
+              </a:blipFill>
+            </p:spPr>
+            <p:txBody>
+              <a:bodyPr/>
+              <a:lstStyle/>
+              <a:p>
+                <a:r>
+                  <a:rPr lang="de-DE">
+                    <a:noFill/>
+                  </a:rPr>
+                  <a:t> </a:t>
+                </a:r>
+              </a:p>
+            </p:txBody>
+          </p:sp>
+        </mc:Fallback>
+      </mc:AlternateContent>
     </p:spTree>
   </p:cSld>
+  <p:clrMapOvr>
+    <a:masterClrMapping/>
+  </p:clrMapOvr>
 </p:sld>
 </file>
 
@@ -4502,265 +4658,4 @@
   </a:objectDefaults>
   <a:extraClrSchemeLst/>
 </a:theme>
-</file>
-
-<file path=ppt/theme/theme2.xml><?xml version="1.0" encoding="utf-8"?>
-<a:theme xmlns:a="http://schemas.openxmlformats.org/drawingml/2006/main" name="Office Theme">
-  <a:themeElements>
-    <a:clrScheme name="Office">
-      <a:dk1>
-        <a:sysClr val="windowText" lastClr="000000"/>
-      </a:dk1>
-      <a:lt1>
-        <a:sysClr val="window" lastClr="FFFFFF"/>
-      </a:lt1>
-      <a:dk2>
-        <a:srgbClr val="44546A"/>
-      </a:dk2>
-      <a:lt2>
-        <a:srgbClr val="E7E6E6"/>
-      </a:lt2>
-      <a:accent1>
-        <a:srgbClr val="5B9BD5"/>
-      </a:accent1>
-      <a:accent2>
-        <a:srgbClr val="ED7D31"/>
-      </a:accent2>
-      <a:accent3>
-        <a:srgbClr val="A5A5A5"/>
-      </a:accent3>
-      <a:accent4>
-        <a:srgbClr val="FFC000"/>
-      </a:accent4>
-      <a:accent5>
-        <a:srgbClr val="4472C4"/>
-      </a:accent5>
-      <a:accent6>
-        <a:srgbClr val="70AD47"/>
-      </a:accent6>
-      <a:hlink>
-        <a:srgbClr val="0563C1"/>
-      </a:hlink>
-      <a:folHlink>
-        <a:srgbClr val="954F72"/>
-      </a:folHlink>
-    </a:clrScheme>
-    <a:fontScheme name="Office">
-      <a:majorFont>
-        <a:latin typeface="Calibri Light" panose="020F0302020204030204"/>
-        <a:ea typeface=""/>
-        <a:cs typeface=""/>
-        <a:font script="Jpan" typeface="ＭＳ Ｐゴシック"/>
-        <a:font script="Hang" typeface="맑은 고딕"/>
-        <a:font script="Hans" typeface="宋体"/>
-        <a:font script="Hant" typeface="新細明體"/>
-        <a:font script="Arab" typeface="Times New Roman"/>
-        <a:font script="Hebr" typeface="Times New Roman"/>
-        <a:font script="Thai" typeface="Angsana New"/>
-        <a:font script="Ethi" typeface="Nyala"/>
-        <a:font script="Beng" typeface="Vrinda"/>
-        <a:font script="Gujr" typeface="Shruti"/>
-        <a:font script="Khmr" typeface="MoolBoran"/>
-        <a:font script="Knda" typeface="Tunga"/>
-        <a:font script="Guru" typeface="Raavi"/>
-        <a:font script="Cans" typeface="Euphemia"/>
-        <a:font script="Cher" typeface="Plantagenet Cherokee"/>
-        <a:font script="Yiii" typeface="Microsoft Yi Baiti"/>
-        <a:font script="Tibt" typeface="Microsoft Himalaya"/>
-        <a:font script="Thaa" typeface="MV Boli"/>
-        <a:font script="Deva" typeface="Mangal"/>
-        <a:font script="Telu" typeface="Gautami"/>
-        <a:font script="Taml" typeface="Latha"/>
-        <a:font script="Syrc" typeface="Estrangelo Edessa"/>
-        <a:font script="Orya" typeface="Kalinga"/>
-        <a:font script="Mlym" typeface="Kartika"/>
-        <a:font script="Laoo" typeface="DokChampa"/>
-        <a:font script="Sinh" typeface="Iskoola Pota"/>
-        <a:font script="Mong" typeface="Mongolian Baiti"/>
-        <a:font script="Viet" typeface="Times New Roman"/>
-        <a:font script="Uigh" typeface="Microsoft Uighur"/>
-        <a:font script="Geor" typeface="Sylfaen"/>
-      </a:majorFont>
-      <a:minorFont>
-        <a:latin typeface="Calibri" panose="020F0502020204030204"/>
-        <a:ea typeface=""/>
-        <a:cs typeface=""/>
-        <a:font script="Jpan" typeface="ＭＳ Ｐゴシック"/>
-        <a:font script="Hang" typeface="맑은 고딕"/>
-        <a:font script="Hans" typeface="宋体"/>
-        <a:font script="Hant" typeface="新細明體"/>
-        <a:font script="Arab" typeface="Arial"/>
-        <a:font script="Hebr" typeface="Arial"/>
-        <a:font script="Thai" typeface="Cordia New"/>
-        <a:font script="Ethi" typeface="Nyala"/>
-        <a:font script="Beng" typeface="Vrinda"/>
-        <a:font script="Gujr" typeface="Shruti"/>
-        <a:font script="Khmr" typeface="DaunPenh"/>
-        <a:font script="Knda" typeface="Tunga"/>
-        <a:font script="Guru" typeface="Raavi"/>
-        <a:font script="Cans" typeface="Euphemia"/>
-        <a:font script="Cher" typeface="Plantagenet Cherokee"/>
-        <a:font script="Yiii" typeface="Microsoft Yi Baiti"/>
-        <a:font script="Tibt" typeface="Microsoft Himalaya"/>
-        <a:font script="Thaa" typeface="MV Boli"/>
-        <a:font script="Deva" typeface="Mangal"/>
-        <a:font script="Telu" typeface="Gautami"/>
-        <a:font script="Taml" typeface="Latha"/>
-        <a:font script="Syrc" typeface="Estrangelo Edessa"/>
-        <a:font script="Orya" typeface="Kalinga"/>
-        <a:font script="Mlym" typeface="Kartika"/>
-        <a:font script="Laoo" typeface="DokChampa"/>
-        <a:font script="Sinh" typeface="Iskoola Pota"/>
-        <a:font script="Mong" typeface="Mongolian Baiti"/>
-        <a:font script="Viet" typeface="Arial"/>
-        <a:font script="Uigh" typeface="Microsoft Uighur"/>
-        <a:font script="Geor" typeface="Sylfaen"/>
-      </a:minorFont>
-    </a:fontScheme>
-    <a:fmtScheme name="Office">
-      <a:fillStyleLst>
-        <a:solidFill>
-          <a:schemeClr val="phClr"/>
-        </a:solidFill>
-        <a:gradFill rotWithShape="1">
-          <a:gsLst>
-            <a:gs pos="0">
-              <a:schemeClr val="phClr">
-                <a:lumMod val="110000"/>
-                <a:satMod val="105000"/>
-                <a:tint val="67000"/>
-              </a:schemeClr>
-            </a:gs>
-            <a:gs pos="50000">
-              <a:schemeClr val="phClr">
-                <a:lumMod val="105000"/>
-                <a:satMod val="103000"/>
-                <a:tint val="73000"/>
-              </a:schemeClr>
-            </a:gs>
-            <a:gs pos="100000">
-              <a:schemeClr val="phClr">
-                <a:lumMod val="105000"/>
-                <a:satMod val="109000"/>
-                <a:tint val="81000"/>
-              </a:schemeClr>
-            </a:gs>
-          </a:gsLst>
-          <a:lin ang="5400000" scaled="0"/>
-        </a:gradFill>
-        <a:gradFill rotWithShape="1">
-          <a:gsLst>
-            <a:gs pos="0">
-              <a:schemeClr val="phClr">
-                <a:satMod val="103000"/>
-                <a:lumMod val="102000"/>
-                <a:tint val="94000"/>
-              </a:schemeClr>
-            </a:gs>
-            <a:gs pos="50000">
-              <a:schemeClr val="phClr">
-                <a:satMod val="110000"/>
-                <a:lumMod val="100000"/>
-                <a:shade val="100000"/>
-              </a:schemeClr>
-            </a:gs>
-            <a:gs pos="100000">
-              <a:schemeClr val="phClr">
-                <a:lumMod val="99000"/>
-                <a:satMod val="120000"/>
-                <a:shade val="78000"/>
-              </a:schemeClr>
-            </a:gs>
-          </a:gsLst>
-          <a:lin ang="5400000" scaled="0"/>
-        </a:gradFill>
-      </a:fillStyleLst>
-      <a:lnStyleLst>
-        <a:ln w="6350" cap="flat" cmpd="sng" algn="ctr">
-          <a:solidFill>
-            <a:schemeClr val="phClr"/>
-          </a:solidFill>
-          <a:prstDash val="solid"/>
-          <a:miter lim="800000"/>
-        </a:ln>
-        <a:ln w="12700" cap="flat" cmpd="sng" algn="ctr">
-          <a:solidFill>
-            <a:schemeClr val="phClr"/>
-          </a:solidFill>
-          <a:prstDash val="solid"/>
-          <a:miter lim="800000"/>
-        </a:ln>
-        <a:ln w="19050" cap="flat" cmpd="sng" algn="ctr">
-          <a:solidFill>
-            <a:schemeClr val="phClr"/>
-          </a:solidFill>
-          <a:prstDash val="solid"/>
-          <a:miter lim="800000"/>
-        </a:ln>
-      </a:lnStyleLst>
-      <a:effectStyleLst>
-        <a:effectStyle>
-          <a:effectLst/>
-        </a:effectStyle>
-        <a:effectStyle>
-          <a:effectLst/>
-        </a:effectStyle>
-        <a:effectStyle>
-          <a:effectLst>
-            <a:outerShdw blurRad="57150" dist="19050" dir="5400000" algn="ctr" rotWithShape="0">
-              <a:srgbClr val="000000">
-                <a:alpha val="63000"/>
-              </a:srgbClr>
-            </a:outerShdw>
-          </a:effectLst>
-        </a:effectStyle>
-      </a:effectStyleLst>
-      <a:bgFillStyleLst>
-        <a:solidFill>
-          <a:schemeClr val="phClr"/>
-        </a:solidFill>
-        <a:solidFill>
-          <a:schemeClr val="phClr">
-            <a:tint val="95000"/>
-            <a:satMod val="170000"/>
-          </a:schemeClr>
-        </a:solidFill>
-        <a:gradFill rotWithShape="1">
-          <a:gsLst>
-            <a:gs pos="0">
-              <a:schemeClr val="phClr">
-                <a:tint val="93000"/>
-                <a:satMod val="150000"/>
-                <a:shade val="98000"/>
-                <a:lumMod val="102000"/>
-              </a:schemeClr>
-            </a:gs>
-            <a:gs pos="50000">
-              <a:schemeClr val="phClr">
-                <a:tint val="98000"/>
-                <a:satMod val="130000"/>
-                <a:shade val="90000"/>
-                <a:lumMod val="103000"/>
-              </a:schemeClr>
-            </a:gs>
-            <a:gs pos="100000">
-              <a:schemeClr val="phClr">
-                <a:shade val="63000"/>
-                <a:satMod val="120000"/>
-              </a:schemeClr>
-            </a:gs>
-          </a:gsLst>
-          <a:lin ang="5400000" scaled="0"/>
-        </a:gradFill>
-      </a:bgFillStyleLst>
-    </a:fmtScheme>
-  </a:themeElements>
-  <a:objectDefaults/>
-  <a:extraClrSchemeLst/>
-  <a:extLst>
-    <a:ext uri="{05A4C25C-085E-4340-85A3-A5531E510DB2}">
-      <thm15:themeFamily xmlns:thm15="http://schemas.microsoft.com/office/thememl/2012/main" name="Office Theme" id="{62F939B6-93AF-4DB8-9C6B-D6C7DFDC589F}" vid="{4A3C46E8-61CC-4603-A589-7422A47A8E4A}"/>
-    </a:ext>
-  </a:extLst>
-</a:theme>
 </file>
</xml_diff>